<commit_message>
fix: update presentation slides
</commit_message>
<xml_diff>
--- a/Slide/3N Slide.pptx
+++ b/Slide/3N Slide.pptx
@@ -5,25 +5,29 @@
     <p:sldMasterId id="2147483795" r:id="rId1"/>
   </p:sldMasterIdLst>
   <p:notesMasterIdLst>
-    <p:notesMasterId r:id="rId18"/>
+    <p:notesMasterId r:id="rId22"/>
   </p:notesMasterIdLst>
   <p:sldIdLst>
     <p:sldId id="256" r:id="rId2"/>
     <p:sldId id="257" r:id="rId3"/>
-    <p:sldId id="258" r:id="rId4"/>
-    <p:sldId id="259" r:id="rId5"/>
-    <p:sldId id="260" r:id="rId6"/>
-    <p:sldId id="261" r:id="rId7"/>
-    <p:sldId id="262" r:id="rId8"/>
-    <p:sldId id="263" r:id="rId9"/>
-    <p:sldId id="264" r:id="rId10"/>
-    <p:sldId id="265" r:id="rId11"/>
-    <p:sldId id="266" r:id="rId12"/>
-    <p:sldId id="289" r:id="rId13"/>
-    <p:sldId id="290" r:id="rId14"/>
-    <p:sldId id="268" r:id="rId15"/>
-    <p:sldId id="291" r:id="rId16"/>
-    <p:sldId id="292" r:id="rId17"/>
+    <p:sldId id="293" r:id="rId4"/>
+    <p:sldId id="258" r:id="rId5"/>
+    <p:sldId id="259" r:id="rId6"/>
+    <p:sldId id="260" r:id="rId7"/>
+    <p:sldId id="261" r:id="rId8"/>
+    <p:sldId id="262" r:id="rId9"/>
+    <p:sldId id="296" r:id="rId10"/>
+    <p:sldId id="294" r:id="rId11"/>
+    <p:sldId id="297" r:id="rId12"/>
+    <p:sldId id="295" r:id="rId13"/>
+    <p:sldId id="264" r:id="rId14"/>
+    <p:sldId id="265" r:id="rId15"/>
+    <p:sldId id="266" r:id="rId16"/>
+    <p:sldId id="289" r:id="rId17"/>
+    <p:sldId id="290" r:id="rId18"/>
+    <p:sldId id="268" r:id="rId19"/>
+    <p:sldId id="291" r:id="rId20"/>
+    <p:sldId id="292" r:id="rId21"/>
   </p:sldIdLst>
   <p:sldSz cx="12192000" cy="6858000"/>
   <p:notesSz cx="6858000" cy="9144000"/>
@@ -916,7 +920,7 @@
 <dgm:dataModel xmlns:dgm="http://schemas.openxmlformats.org/drawingml/2006/diagram" xmlns:a="http://schemas.openxmlformats.org/drawingml/2006/main">
   <dgm:ptLst>
     <dgm:pt modelId="{A3B73972-3B8C-49F2-9182-EFEC4F95AE9D}" type="doc">
-      <dgm:prSet loTypeId="urn:microsoft.com/office/officeart/2005/8/layout/vProcess5" loCatId="process" qsTypeId="urn:microsoft.com/office/officeart/2005/8/quickstyle/simple1" qsCatId="simple" csTypeId="urn:microsoft.com/office/officeart/2005/8/colors/colorful2" csCatId="colorful"/>
+      <dgm:prSet loTypeId="urn:microsoft.com/office/officeart/2005/8/layout/vProcess5" loCatId="process" qsTypeId="urn:microsoft.com/office/officeart/2005/8/quickstyle/simple1" qsCatId="simple" csTypeId="urn:microsoft.com/office/officeart/2005/8/colors/colorful2" csCatId="colorful" phldr="1"/>
       <dgm:spPr/>
       <dgm:t>
         <a:bodyPr/>
@@ -934,10 +938,14 @@
         <a:lstStyle/>
         <a:p>
           <a:r>
-            <a:rPr lang="en-US" baseline="0"/>
-            <a:t>Usecase Diagram</a:t>
+            <a:rPr lang="en-US" baseline="0" dirty="0" err="1"/>
+            <a:t>Usecase</a:t>
           </a:r>
-          <a:endParaRPr lang="en-US"/>
+          <a:r>
+            <a:rPr lang="en-US" baseline="0" dirty="0"/>
+            <a:t> Diagram</a:t>
+          </a:r>
+          <a:endParaRPr lang="en-US" dirty="0"/>
         </a:p>
       </dgm:t>
     </dgm:pt>
@@ -1074,6 +1082,42 @@
         </a:p>
       </dgm:t>
     </dgm:pt>
+    <dgm:pt modelId="{85603306-04BE-474A-A72F-C8D1C20075A3}">
+      <dgm:prSet/>
+      <dgm:spPr/>
+      <dgm:t>
+        <a:bodyPr/>
+        <a:lstStyle/>
+        <a:p>
+          <a:r>
+            <a:rPr lang="en-US" dirty="0"/>
+            <a:t>Application Architecture</a:t>
+          </a:r>
+        </a:p>
+      </dgm:t>
+    </dgm:pt>
+    <dgm:pt modelId="{D3167ECE-61E2-BB4E-B3A7-BFE6AD43BC07}" type="parTrans" cxnId="{D719B7B1-3662-584C-BE1D-540F0341BE3A}">
+      <dgm:prSet/>
+      <dgm:spPr/>
+      <dgm:t>
+        <a:bodyPr/>
+        <a:lstStyle/>
+        <a:p>
+          <a:endParaRPr lang="en-US"/>
+        </a:p>
+      </dgm:t>
+    </dgm:pt>
+    <dgm:pt modelId="{C550B5E6-F912-E24D-8768-445961BC2814}" type="sibTrans" cxnId="{D719B7B1-3662-584C-BE1D-540F0341BE3A}">
+      <dgm:prSet/>
+      <dgm:spPr/>
+      <dgm:t>
+        <a:bodyPr/>
+        <a:lstStyle/>
+        <a:p>
+          <a:endParaRPr lang="en-US"/>
+        </a:p>
+      </dgm:t>
+    </dgm:pt>
     <dgm:pt modelId="{E4707BE7-7EDF-4837-A35B-6A9A917707EA}" type="pres">
       <dgm:prSet presAssocID="{A3B73972-3B8C-49F2-9182-EFEC4F95AE9D}" presName="outerComposite" presStyleCnt="0">
         <dgm:presLayoutVars>
@@ -1090,88 +1134,112 @@
       </dgm:prSet>
       <dgm:spPr/>
     </dgm:pt>
-    <dgm:pt modelId="{C2779C57-EEC1-4CE4-AF65-7F151945A742}" type="pres">
-      <dgm:prSet presAssocID="{A3B73972-3B8C-49F2-9182-EFEC4F95AE9D}" presName="FourNodes_1" presStyleLbl="node1" presStyleIdx="0" presStyleCnt="4">
+    <dgm:pt modelId="{1E3B8D16-C4F7-BB41-AA0D-C94E4247F00A}" type="pres">
+      <dgm:prSet presAssocID="{A3B73972-3B8C-49F2-9182-EFEC4F95AE9D}" presName="FiveNodes_1" presStyleLbl="node1" presStyleIdx="0" presStyleCnt="5">
         <dgm:presLayoutVars>
           <dgm:bulletEnabled val="1"/>
         </dgm:presLayoutVars>
       </dgm:prSet>
       <dgm:spPr/>
     </dgm:pt>
-    <dgm:pt modelId="{2ABE2EAF-269E-49D9-AC64-286BFABA70BC}" type="pres">
-      <dgm:prSet presAssocID="{A3B73972-3B8C-49F2-9182-EFEC4F95AE9D}" presName="FourNodes_2" presStyleLbl="node1" presStyleIdx="1" presStyleCnt="4">
+    <dgm:pt modelId="{FF063622-72C9-ED4F-BA28-EEEBB15FF303}" type="pres">
+      <dgm:prSet presAssocID="{A3B73972-3B8C-49F2-9182-EFEC4F95AE9D}" presName="FiveNodes_2" presStyleLbl="node1" presStyleIdx="1" presStyleCnt="5">
         <dgm:presLayoutVars>
           <dgm:bulletEnabled val="1"/>
         </dgm:presLayoutVars>
       </dgm:prSet>
       <dgm:spPr/>
     </dgm:pt>
-    <dgm:pt modelId="{FD3EBF0A-CFBA-4E8F-9E11-F76E14037496}" type="pres">
-      <dgm:prSet presAssocID="{A3B73972-3B8C-49F2-9182-EFEC4F95AE9D}" presName="FourNodes_3" presStyleLbl="node1" presStyleIdx="2" presStyleCnt="4">
+    <dgm:pt modelId="{8BAE6423-0C5E-A045-95D1-A5D78D0DB807}" type="pres">
+      <dgm:prSet presAssocID="{A3B73972-3B8C-49F2-9182-EFEC4F95AE9D}" presName="FiveNodes_3" presStyleLbl="node1" presStyleIdx="2" presStyleCnt="5">
         <dgm:presLayoutVars>
           <dgm:bulletEnabled val="1"/>
         </dgm:presLayoutVars>
       </dgm:prSet>
       <dgm:spPr/>
     </dgm:pt>
-    <dgm:pt modelId="{6199B417-0D6C-4F24-B767-9CC7E89A35A0}" type="pres">
-      <dgm:prSet presAssocID="{A3B73972-3B8C-49F2-9182-EFEC4F95AE9D}" presName="FourNodes_4" presStyleLbl="node1" presStyleIdx="3" presStyleCnt="4">
+    <dgm:pt modelId="{058EB57E-6CE2-6945-BF23-7F12BE3F3A1F}" type="pres">
+      <dgm:prSet presAssocID="{A3B73972-3B8C-49F2-9182-EFEC4F95AE9D}" presName="FiveNodes_4" presStyleLbl="node1" presStyleIdx="3" presStyleCnt="5">
         <dgm:presLayoutVars>
           <dgm:bulletEnabled val="1"/>
         </dgm:presLayoutVars>
       </dgm:prSet>
       <dgm:spPr/>
     </dgm:pt>
-    <dgm:pt modelId="{46D3AC0B-090B-44E8-B5DA-ED3649F14CC4}" type="pres">
-      <dgm:prSet presAssocID="{A3B73972-3B8C-49F2-9182-EFEC4F95AE9D}" presName="FourConn_1-2" presStyleLbl="fgAccFollowNode1" presStyleIdx="0" presStyleCnt="3">
+    <dgm:pt modelId="{15B25370-460D-374D-9F5D-0E44F6433FD6}" type="pres">
+      <dgm:prSet presAssocID="{A3B73972-3B8C-49F2-9182-EFEC4F95AE9D}" presName="FiveNodes_5" presStyleLbl="node1" presStyleIdx="4" presStyleCnt="5">
         <dgm:presLayoutVars>
           <dgm:bulletEnabled val="1"/>
         </dgm:presLayoutVars>
       </dgm:prSet>
       <dgm:spPr/>
     </dgm:pt>
-    <dgm:pt modelId="{358B1A01-870F-4CA9-916D-154B0DEDF13D}" type="pres">
-      <dgm:prSet presAssocID="{A3B73972-3B8C-49F2-9182-EFEC4F95AE9D}" presName="FourConn_2-3" presStyleLbl="fgAccFollowNode1" presStyleIdx="1" presStyleCnt="3">
+    <dgm:pt modelId="{70B98F60-66CE-054C-B160-125990959E3E}" type="pres">
+      <dgm:prSet presAssocID="{A3B73972-3B8C-49F2-9182-EFEC4F95AE9D}" presName="FiveConn_1-2" presStyleLbl="fgAccFollowNode1" presStyleIdx="0" presStyleCnt="4">
         <dgm:presLayoutVars>
           <dgm:bulletEnabled val="1"/>
         </dgm:presLayoutVars>
       </dgm:prSet>
       <dgm:spPr/>
     </dgm:pt>
-    <dgm:pt modelId="{925D03D4-D13F-468E-8490-A59C7A5804A1}" type="pres">
-      <dgm:prSet presAssocID="{A3B73972-3B8C-49F2-9182-EFEC4F95AE9D}" presName="FourConn_3-4" presStyleLbl="fgAccFollowNode1" presStyleIdx="2" presStyleCnt="3">
+    <dgm:pt modelId="{7FA9F3E3-37F8-F64F-A4D8-90EA7B9FC075}" type="pres">
+      <dgm:prSet presAssocID="{A3B73972-3B8C-49F2-9182-EFEC4F95AE9D}" presName="FiveConn_2-3" presStyleLbl="fgAccFollowNode1" presStyleIdx="1" presStyleCnt="4">
         <dgm:presLayoutVars>
           <dgm:bulletEnabled val="1"/>
         </dgm:presLayoutVars>
       </dgm:prSet>
       <dgm:spPr/>
     </dgm:pt>
-    <dgm:pt modelId="{193D28C0-205B-4C52-AB3B-F1F20CD3CA60}" type="pres">
-      <dgm:prSet presAssocID="{A3B73972-3B8C-49F2-9182-EFEC4F95AE9D}" presName="FourNodes_1_text" presStyleLbl="node1" presStyleIdx="3" presStyleCnt="4">
+    <dgm:pt modelId="{C5D185D8-0EF4-0C45-BBC3-C8D2341A1B13}" type="pres">
+      <dgm:prSet presAssocID="{A3B73972-3B8C-49F2-9182-EFEC4F95AE9D}" presName="FiveConn_3-4" presStyleLbl="fgAccFollowNode1" presStyleIdx="2" presStyleCnt="4">
         <dgm:presLayoutVars>
           <dgm:bulletEnabled val="1"/>
         </dgm:presLayoutVars>
       </dgm:prSet>
       <dgm:spPr/>
     </dgm:pt>
-    <dgm:pt modelId="{DE50ACF2-5BD3-435B-A32D-17CF5BCF1D91}" type="pres">
-      <dgm:prSet presAssocID="{A3B73972-3B8C-49F2-9182-EFEC4F95AE9D}" presName="FourNodes_2_text" presStyleLbl="node1" presStyleIdx="3" presStyleCnt="4">
+    <dgm:pt modelId="{486BFA6B-169E-E04B-B7C2-04D8230B03E7}" type="pres">
+      <dgm:prSet presAssocID="{A3B73972-3B8C-49F2-9182-EFEC4F95AE9D}" presName="FiveConn_4-5" presStyleLbl="fgAccFollowNode1" presStyleIdx="3" presStyleCnt="4">
         <dgm:presLayoutVars>
           <dgm:bulletEnabled val="1"/>
         </dgm:presLayoutVars>
       </dgm:prSet>
       <dgm:spPr/>
     </dgm:pt>
-    <dgm:pt modelId="{872E1480-7344-4E32-A1F5-60BBEE0062F3}" type="pres">
-      <dgm:prSet presAssocID="{A3B73972-3B8C-49F2-9182-EFEC4F95AE9D}" presName="FourNodes_3_text" presStyleLbl="node1" presStyleIdx="3" presStyleCnt="4">
+    <dgm:pt modelId="{92F9DF7F-BE4D-5D42-980D-3F70EFAA613C}" type="pres">
+      <dgm:prSet presAssocID="{A3B73972-3B8C-49F2-9182-EFEC4F95AE9D}" presName="FiveNodes_1_text" presStyleLbl="node1" presStyleIdx="4" presStyleCnt="5">
         <dgm:presLayoutVars>
           <dgm:bulletEnabled val="1"/>
         </dgm:presLayoutVars>
       </dgm:prSet>
       <dgm:spPr/>
     </dgm:pt>
-    <dgm:pt modelId="{38169E5E-F0AB-43A4-A7A3-D5E483705663}" type="pres">
-      <dgm:prSet presAssocID="{A3B73972-3B8C-49F2-9182-EFEC4F95AE9D}" presName="FourNodes_4_text" presStyleLbl="node1" presStyleIdx="3" presStyleCnt="4">
+    <dgm:pt modelId="{93DC7F84-213F-3545-ACDC-119223231611}" type="pres">
+      <dgm:prSet presAssocID="{A3B73972-3B8C-49F2-9182-EFEC4F95AE9D}" presName="FiveNodes_2_text" presStyleLbl="node1" presStyleIdx="4" presStyleCnt="5">
+        <dgm:presLayoutVars>
+          <dgm:bulletEnabled val="1"/>
+        </dgm:presLayoutVars>
+      </dgm:prSet>
+      <dgm:spPr/>
+    </dgm:pt>
+    <dgm:pt modelId="{3143FD0A-99A3-234B-A197-8BAC0FA644EF}" type="pres">
+      <dgm:prSet presAssocID="{A3B73972-3B8C-49F2-9182-EFEC4F95AE9D}" presName="FiveNodes_3_text" presStyleLbl="node1" presStyleIdx="4" presStyleCnt="5">
+        <dgm:presLayoutVars>
+          <dgm:bulletEnabled val="1"/>
+        </dgm:presLayoutVars>
+      </dgm:prSet>
+      <dgm:spPr/>
+    </dgm:pt>
+    <dgm:pt modelId="{CD8D60EC-1228-DA43-818B-EC2B32870941}" type="pres">
+      <dgm:prSet presAssocID="{A3B73972-3B8C-49F2-9182-EFEC4F95AE9D}" presName="FiveNodes_4_text" presStyleLbl="node1" presStyleIdx="4" presStyleCnt="5">
+        <dgm:presLayoutVars>
+          <dgm:bulletEnabled val="1"/>
+        </dgm:presLayoutVars>
+      </dgm:prSet>
+      <dgm:spPr/>
+    </dgm:pt>
+    <dgm:pt modelId="{1ADE09CF-528D-8A4F-BD38-C8CFDC19893A}" type="pres">
+      <dgm:prSet presAssocID="{A3B73972-3B8C-49F2-9182-EFEC4F95AE9D}" presName="FiveNodes_5_text" presStyleLbl="node1" presStyleIdx="4" presStyleCnt="5">
         <dgm:presLayoutVars>
           <dgm:bulletEnabled val="1"/>
         </dgm:presLayoutVars>
@@ -1180,34 +1248,41 @@
     </dgm:pt>
   </dgm:ptLst>
   <dgm:cxnLst>
-    <dgm:cxn modelId="{4DB9BE0B-0E38-4C1A-B3ED-BF86B804D270}" type="presOf" srcId="{F97FAEB6-CA1F-49C8-B5C7-2AF67B7ED3A7}" destId="{FD3EBF0A-CFBA-4E8F-9E11-F76E14037496}" srcOrd="0" destOrd="0" presId="urn:microsoft.com/office/officeart/2005/8/layout/vProcess5"/>
-    <dgm:cxn modelId="{A08A8612-872F-4B1A-A119-B6747E416E7D}" type="presOf" srcId="{086528CC-F7B4-44D5-B910-0D39C75CE318}" destId="{46D3AC0B-090B-44E8-B5DA-ED3649F14CC4}" srcOrd="0" destOrd="0" presId="urn:microsoft.com/office/officeart/2005/8/layout/vProcess5"/>
-    <dgm:cxn modelId="{B727EB26-F8E2-4446-A71D-53574B3545EE}" type="presOf" srcId="{3F703729-5FC1-4D48-B811-4872B93B1205}" destId="{193D28C0-205B-4C52-AB3B-F1F20CD3CA60}" srcOrd="1" destOrd="0" presId="urn:microsoft.com/office/officeart/2005/8/layout/vProcess5"/>
-    <dgm:cxn modelId="{DBC0DD27-5EF2-4780-80A9-0BFD95C3B3B9}" type="presOf" srcId="{3F703729-5FC1-4D48-B811-4872B93B1205}" destId="{C2779C57-EEC1-4CE4-AF65-7F151945A742}" srcOrd="0" destOrd="0" presId="urn:microsoft.com/office/officeart/2005/8/layout/vProcess5"/>
-    <dgm:cxn modelId="{40BB3E2D-1EB7-4110-9A22-F5DCB52AAEDB}" type="presOf" srcId="{C0B0EF29-9D14-4156-BBD5-D12709644C55}" destId="{DE50ACF2-5BD3-435B-A32D-17CF5BCF1D91}" srcOrd="1" destOrd="0" presId="urn:microsoft.com/office/officeart/2005/8/layout/vProcess5"/>
-    <dgm:cxn modelId="{D9D6CB2F-BBAE-4938-A229-47F87AC2D590}" srcId="{A3B73972-3B8C-49F2-9182-EFEC4F95AE9D}" destId="{AF09F828-0C4B-4F46-B6D5-6E0BEB337646}" srcOrd="3" destOrd="0" parTransId="{85129B00-5809-4E91-95E3-EBB77DA915D8}" sibTransId="{FDB6CA87-5414-4D80-890E-12581AE606C2}"/>
-    <dgm:cxn modelId="{CD323A3C-BF22-4EE9-BA11-D54B3EB1216D}" type="presOf" srcId="{AF09F828-0C4B-4F46-B6D5-6E0BEB337646}" destId="{38169E5E-F0AB-43A4-A7A3-D5E483705663}" srcOrd="1" destOrd="0" presId="urn:microsoft.com/office/officeart/2005/8/layout/vProcess5"/>
-    <dgm:cxn modelId="{0A28576C-ABC6-425B-BBAB-2302DA9FFE3C}" srcId="{A3B73972-3B8C-49F2-9182-EFEC4F95AE9D}" destId="{C0B0EF29-9D14-4156-BBD5-D12709644C55}" srcOrd="1" destOrd="0" parTransId="{C5AF38EA-4BEF-4DB9-96AF-CD4C04FD4903}" sibTransId="{B7AFA47F-B61E-41A6-8E6E-BE3B78E9367E}"/>
-    <dgm:cxn modelId="{34D42C7D-01FF-4FFD-95B4-3BD63E81C8F2}" type="presOf" srcId="{F97FAEB6-CA1F-49C8-B5C7-2AF67B7ED3A7}" destId="{872E1480-7344-4E32-A1F5-60BBEE0062F3}" srcOrd="1" destOrd="0" presId="urn:microsoft.com/office/officeart/2005/8/layout/vProcess5"/>
-    <dgm:cxn modelId="{E53E7295-D417-423D-83A9-77DB177FEF22}" srcId="{A3B73972-3B8C-49F2-9182-EFEC4F95AE9D}" destId="{3F703729-5FC1-4D48-B811-4872B93B1205}" srcOrd="0" destOrd="0" parTransId="{490708AA-73EE-4053-B62C-8CCAD78781C1}" sibTransId="{086528CC-F7B4-44D5-B910-0D39C75CE318}"/>
-    <dgm:cxn modelId="{DED0CAC2-69C8-4182-9DFA-2A8F30AF1AF2}" srcId="{A3B73972-3B8C-49F2-9182-EFEC4F95AE9D}" destId="{F97FAEB6-CA1F-49C8-B5C7-2AF67B7ED3A7}" srcOrd="2" destOrd="0" parTransId="{CCAC7A88-DEA3-4BE1-A65A-D6B81E7C97A2}" sibTransId="{D0C8CEF4-63C3-40D1-9F98-CC2061DBDB2A}"/>
-    <dgm:cxn modelId="{48BDC0C7-5844-49F3-90EA-BC7C10246BBD}" type="presOf" srcId="{AF09F828-0C4B-4F46-B6D5-6E0BEB337646}" destId="{6199B417-0D6C-4F24-B767-9CC7E89A35A0}" srcOrd="0" destOrd="0" presId="urn:microsoft.com/office/officeart/2005/8/layout/vProcess5"/>
-    <dgm:cxn modelId="{A23028E4-0CEF-4F05-AE00-CA346EA6FE44}" type="presOf" srcId="{C0B0EF29-9D14-4156-BBD5-D12709644C55}" destId="{2ABE2EAF-269E-49D9-AC64-286BFABA70BC}" srcOrd="0" destOrd="0" presId="urn:microsoft.com/office/officeart/2005/8/layout/vProcess5"/>
-    <dgm:cxn modelId="{EAD690E6-88A9-4BDA-A1EE-94500733CC8D}" type="presOf" srcId="{B7AFA47F-B61E-41A6-8E6E-BE3B78E9367E}" destId="{358B1A01-870F-4CA9-916D-154B0DEDF13D}" srcOrd="0" destOrd="0" presId="urn:microsoft.com/office/officeart/2005/8/layout/vProcess5"/>
-    <dgm:cxn modelId="{B6E326ED-9000-4DC0-9337-61F48EBBF495}" type="presOf" srcId="{D0C8CEF4-63C3-40D1-9F98-CC2061DBDB2A}" destId="{925D03D4-D13F-468E-8490-A59C7A5804A1}" srcOrd="0" destOrd="0" presId="urn:microsoft.com/office/officeart/2005/8/layout/vProcess5"/>
+    <dgm:cxn modelId="{0B06B904-E586-534F-A04D-1B2BDD181F52}" type="presOf" srcId="{F97FAEB6-CA1F-49C8-B5C7-2AF67B7ED3A7}" destId="{CD8D60EC-1228-DA43-818B-EC2B32870941}" srcOrd="1" destOrd="0" presId="urn:microsoft.com/office/officeart/2005/8/layout/vProcess5"/>
+    <dgm:cxn modelId="{D9D6CB2F-BBAE-4938-A229-47F87AC2D590}" srcId="{A3B73972-3B8C-49F2-9182-EFEC4F95AE9D}" destId="{AF09F828-0C4B-4F46-B6D5-6E0BEB337646}" srcOrd="4" destOrd="0" parTransId="{85129B00-5809-4E91-95E3-EBB77DA915D8}" sibTransId="{FDB6CA87-5414-4D80-890E-12581AE606C2}"/>
+    <dgm:cxn modelId="{3D74CC35-1278-EA44-B5A8-F99CED246BDE}" type="presOf" srcId="{AF09F828-0C4B-4F46-B6D5-6E0BEB337646}" destId="{1ADE09CF-528D-8A4F-BD38-C8CFDC19893A}" srcOrd="1" destOrd="0" presId="urn:microsoft.com/office/officeart/2005/8/layout/vProcess5"/>
+    <dgm:cxn modelId="{3705794B-E868-1F4D-BC28-14F3B860AD70}" type="presOf" srcId="{3F703729-5FC1-4D48-B811-4872B93B1205}" destId="{FF063622-72C9-ED4F-BA28-EEEBB15FF303}" srcOrd="0" destOrd="0" presId="urn:microsoft.com/office/officeart/2005/8/layout/vProcess5"/>
+    <dgm:cxn modelId="{475DFE4B-F50F-8040-AFEE-8397BA8B06EB}" type="presOf" srcId="{D0C8CEF4-63C3-40D1-9F98-CC2061DBDB2A}" destId="{486BFA6B-169E-E04B-B7C2-04D8230B03E7}" srcOrd="0" destOrd="0" presId="urn:microsoft.com/office/officeart/2005/8/layout/vProcess5"/>
+    <dgm:cxn modelId="{0A28576C-ABC6-425B-BBAB-2302DA9FFE3C}" srcId="{A3B73972-3B8C-49F2-9182-EFEC4F95AE9D}" destId="{C0B0EF29-9D14-4156-BBD5-D12709644C55}" srcOrd="2" destOrd="0" parTransId="{C5AF38EA-4BEF-4DB9-96AF-CD4C04FD4903}" sibTransId="{B7AFA47F-B61E-41A6-8E6E-BE3B78E9367E}"/>
+    <dgm:cxn modelId="{67BD087A-8568-5D4D-AAD0-A49D31B7A60D}" type="presOf" srcId="{3F703729-5FC1-4D48-B811-4872B93B1205}" destId="{93DC7F84-213F-3545-ACDC-119223231611}" srcOrd="1" destOrd="0" presId="urn:microsoft.com/office/officeart/2005/8/layout/vProcess5"/>
+    <dgm:cxn modelId="{8AD59094-AB45-6441-A52C-A13216180A7E}" type="presOf" srcId="{85603306-04BE-474A-A72F-C8D1C20075A3}" destId="{92F9DF7F-BE4D-5D42-980D-3F70EFAA613C}" srcOrd="1" destOrd="0" presId="urn:microsoft.com/office/officeart/2005/8/layout/vProcess5"/>
+    <dgm:cxn modelId="{E53E7295-D417-423D-83A9-77DB177FEF22}" srcId="{A3B73972-3B8C-49F2-9182-EFEC4F95AE9D}" destId="{3F703729-5FC1-4D48-B811-4872B93B1205}" srcOrd="1" destOrd="0" parTransId="{490708AA-73EE-4053-B62C-8CCAD78781C1}" sibTransId="{086528CC-F7B4-44D5-B910-0D39C75CE318}"/>
+    <dgm:cxn modelId="{B8459398-F4D9-6A41-97AA-2E8E6D2AAF04}" type="presOf" srcId="{086528CC-F7B4-44D5-B910-0D39C75CE318}" destId="{7FA9F3E3-37F8-F64F-A4D8-90EA7B9FC075}" srcOrd="0" destOrd="0" presId="urn:microsoft.com/office/officeart/2005/8/layout/vProcess5"/>
+    <dgm:cxn modelId="{D719B7B1-3662-584C-BE1D-540F0341BE3A}" srcId="{A3B73972-3B8C-49F2-9182-EFEC4F95AE9D}" destId="{85603306-04BE-474A-A72F-C8D1C20075A3}" srcOrd="0" destOrd="0" parTransId="{D3167ECE-61E2-BB4E-B3A7-BFE6AD43BC07}" sibTransId="{C550B5E6-F912-E24D-8768-445961BC2814}"/>
+    <dgm:cxn modelId="{15FA18C0-D02F-5649-978B-F671833CA644}" type="presOf" srcId="{AF09F828-0C4B-4F46-B6D5-6E0BEB337646}" destId="{15B25370-460D-374D-9F5D-0E44F6433FD6}" srcOrd="0" destOrd="0" presId="urn:microsoft.com/office/officeart/2005/8/layout/vProcess5"/>
+    <dgm:cxn modelId="{DED0CAC2-69C8-4182-9DFA-2A8F30AF1AF2}" srcId="{A3B73972-3B8C-49F2-9182-EFEC4F95AE9D}" destId="{F97FAEB6-CA1F-49C8-B5C7-2AF67B7ED3A7}" srcOrd="3" destOrd="0" parTransId="{CCAC7A88-DEA3-4BE1-A65A-D6B81E7C97A2}" sibTransId="{D0C8CEF4-63C3-40D1-9F98-CC2061DBDB2A}"/>
+    <dgm:cxn modelId="{1BCDC7C3-CB18-4049-A611-5E9003D7E743}" type="presOf" srcId="{C0B0EF29-9D14-4156-BBD5-D12709644C55}" destId="{8BAE6423-0C5E-A045-95D1-A5D78D0DB807}" srcOrd="0" destOrd="0" presId="urn:microsoft.com/office/officeart/2005/8/layout/vProcess5"/>
+    <dgm:cxn modelId="{873CACC7-E88D-0F4D-B8B1-2EE1A798ABD5}" type="presOf" srcId="{C0B0EF29-9D14-4156-BBD5-D12709644C55}" destId="{3143FD0A-99A3-234B-A197-8BAC0FA644EF}" srcOrd="1" destOrd="0" presId="urn:microsoft.com/office/officeart/2005/8/layout/vProcess5"/>
+    <dgm:cxn modelId="{689654CF-2C45-E54E-BE79-7D811E10A20A}" type="presOf" srcId="{C550B5E6-F912-E24D-8768-445961BC2814}" destId="{70B98F60-66CE-054C-B160-125990959E3E}" srcOrd="0" destOrd="0" presId="urn:microsoft.com/office/officeart/2005/8/layout/vProcess5"/>
+    <dgm:cxn modelId="{5CE7E7E5-5AA1-234D-97FA-06E6090B21B2}" type="presOf" srcId="{B7AFA47F-B61E-41A6-8E6E-BE3B78E9367E}" destId="{C5D185D8-0EF4-0C45-BBC3-C8D2341A1B13}" srcOrd="0" destOrd="0" presId="urn:microsoft.com/office/officeart/2005/8/layout/vProcess5"/>
+    <dgm:cxn modelId="{42F79AF2-1F76-104E-9157-90B1D87A5F2C}" type="presOf" srcId="{F97FAEB6-CA1F-49C8-B5C7-2AF67B7ED3A7}" destId="{058EB57E-6CE2-6945-BF23-7F12BE3F3A1F}" srcOrd="0" destOrd="0" presId="urn:microsoft.com/office/officeart/2005/8/layout/vProcess5"/>
+    <dgm:cxn modelId="{88F23FF5-4DD9-7840-8A4E-DA9296860CDC}" type="presOf" srcId="{85603306-04BE-474A-A72F-C8D1C20075A3}" destId="{1E3B8D16-C4F7-BB41-AA0D-C94E4247F00A}" srcOrd="0" destOrd="0" presId="urn:microsoft.com/office/officeart/2005/8/layout/vProcess5"/>
     <dgm:cxn modelId="{861A5FFC-8F5B-48DF-85CA-15D1B3D23D95}" type="presOf" srcId="{A3B73972-3B8C-49F2-9182-EFEC4F95AE9D}" destId="{E4707BE7-7EDF-4837-A35B-6A9A917707EA}" srcOrd="0" destOrd="0" presId="urn:microsoft.com/office/officeart/2005/8/layout/vProcess5"/>
-    <dgm:cxn modelId="{7902804F-1185-4DFA-A7A8-7D125AEBF034}" type="presParOf" srcId="{E4707BE7-7EDF-4837-A35B-6A9A917707EA}" destId="{B4B9D4BC-1BF4-44EA-8646-CDDB4565CB2F}" srcOrd="0" destOrd="0" presId="urn:microsoft.com/office/officeart/2005/8/layout/vProcess5"/>
-    <dgm:cxn modelId="{386E05CE-AF9C-42F0-904D-E63A4255DC25}" type="presParOf" srcId="{E4707BE7-7EDF-4837-A35B-6A9A917707EA}" destId="{C2779C57-EEC1-4CE4-AF65-7F151945A742}" srcOrd="1" destOrd="0" presId="urn:microsoft.com/office/officeart/2005/8/layout/vProcess5"/>
-    <dgm:cxn modelId="{F3859E18-F72F-489B-A04E-8F72F997D09F}" type="presParOf" srcId="{E4707BE7-7EDF-4837-A35B-6A9A917707EA}" destId="{2ABE2EAF-269E-49D9-AC64-286BFABA70BC}" srcOrd="2" destOrd="0" presId="urn:microsoft.com/office/officeart/2005/8/layout/vProcess5"/>
-    <dgm:cxn modelId="{06A84E6B-8CAF-436E-BEFE-198F15DF4ADC}" type="presParOf" srcId="{E4707BE7-7EDF-4837-A35B-6A9A917707EA}" destId="{FD3EBF0A-CFBA-4E8F-9E11-F76E14037496}" srcOrd="3" destOrd="0" presId="urn:microsoft.com/office/officeart/2005/8/layout/vProcess5"/>
-    <dgm:cxn modelId="{F92A43AF-5917-47F7-BFCE-06F315240DB6}" type="presParOf" srcId="{E4707BE7-7EDF-4837-A35B-6A9A917707EA}" destId="{6199B417-0D6C-4F24-B767-9CC7E89A35A0}" srcOrd="4" destOrd="0" presId="urn:microsoft.com/office/officeart/2005/8/layout/vProcess5"/>
-    <dgm:cxn modelId="{485C4E04-A0CF-4769-86AD-1A0E19F1D08E}" type="presParOf" srcId="{E4707BE7-7EDF-4837-A35B-6A9A917707EA}" destId="{46D3AC0B-090B-44E8-B5DA-ED3649F14CC4}" srcOrd="5" destOrd="0" presId="urn:microsoft.com/office/officeart/2005/8/layout/vProcess5"/>
-    <dgm:cxn modelId="{E52FCB81-088A-454F-A04E-A846CB810D1F}" type="presParOf" srcId="{E4707BE7-7EDF-4837-A35B-6A9A917707EA}" destId="{358B1A01-870F-4CA9-916D-154B0DEDF13D}" srcOrd="6" destOrd="0" presId="urn:microsoft.com/office/officeart/2005/8/layout/vProcess5"/>
-    <dgm:cxn modelId="{61B0363B-2DAA-4645-A93B-32F758DDE9B7}" type="presParOf" srcId="{E4707BE7-7EDF-4837-A35B-6A9A917707EA}" destId="{925D03D4-D13F-468E-8490-A59C7A5804A1}" srcOrd="7" destOrd="0" presId="urn:microsoft.com/office/officeart/2005/8/layout/vProcess5"/>
-    <dgm:cxn modelId="{1C01BDDE-BA31-4724-8D10-CD2DFE1AF7C4}" type="presParOf" srcId="{E4707BE7-7EDF-4837-A35B-6A9A917707EA}" destId="{193D28C0-205B-4C52-AB3B-F1F20CD3CA60}" srcOrd="8" destOrd="0" presId="urn:microsoft.com/office/officeart/2005/8/layout/vProcess5"/>
-    <dgm:cxn modelId="{0FD4AE8C-05BA-455A-BE00-01AD59BC6B22}" type="presParOf" srcId="{E4707BE7-7EDF-4837-A35B-6A9A917707EA}" destId="{DE50ACF2-5BD3-435B-A32D-17CF5BCF1D91}" srcOrd="9" destOrd="0" presId="urn:microsoft.com/office/officeart/2005/8/layout/vProcess5"/>
-    <dgm:cxn modelId="{546AD05E-1BE7-441D-81C2-8E0701C97D54}" type="presParOf" srcId="{E4707BE7-7EDF-4837-A35B-6A9A917707EA}" destId="{872E1480-7344-4E32-A1F5-60BBEE0062F3}" srcOrd="10" destOrd="0" presId="urn:microsoft.com/office/officeart/2005/8/layout/vProcess5"/>
-    <dgm:cxn modelId="{65332E9E-4CD5-4EAE-9214-1DFE10703685}" type="presParOf" srcId="{E4707BE7-7EDF-4837-A35B-6A9A917707EA}" destId="{38169E5E-F0AB-43A4-A7A3-D5E483705663}" srcOrd="11" destOrd="0" presId="urn:microsoft.com/office/officeart/2005/8/layout/vProcess5"/>
+    <dgm:cxn modelId="{215A5BE9-98D4-4D43-8194-070259CB1BA8}" type="presParOf" srcId="{E4707BE7-7EDF-4837-A35B-6A9A917707EA}" destId="{B4B9D4BC-1BF4-44EA-8646-CDDB4565CB2F}" srcOrd="0" destOrd="0" presId="urn:microsoft.com/office/officeart/2005/8/layout/vProcess5"/>
+    <dgm:cxn modelId="{187C20CA-C6E0-EF4C-A8DE-48987AEDF6AD}" type="presParOf" srcId="{E4707BE7-7EDF-4837-A35B-6A9A917707EA}" destId="{1E3B8D16-C4F7-BB41-AA0D-C94E4247F00A}" srcOrd="1" destOrd="0" presId="urn:microsoft.com/office/officeart/2005/8/layout/vProcess5"/>
+    <dgm:cxn modelId="{72C10755-EF15-F14F-B550-E42270FBB38D}" type="presParOf" srcId="{E4707BE7-7EDF-4837-A35B-6A9A917707EA}" destId="{FF063622-72C9-ED4F-BA28-EEEBB15FF303}" srcOrd="2" destOrd="0" presId="urn:microsoft.com/office/officeart/2005/8/layout/vProcess5"/>
+    <dgm:cxn modelId="{53E06221-FC1F-D244-9AF2-C31A4DD78E07}" type="presParOf" srcId="{E4707BE7-7EDF-4837-A35B-6A9A917707EA}" destId="{8BAE6423-0C5E-A045-95D1-A5D78D0DB807}" srcOrd="3" destOrd="0" presId="urn:microsoft.com/office/officeart/2005/8/layout/vProcess5"/>
+    <dgm:cxn modelId="{A2E934F9-117D-094A-9236-090D67253884}" type="presParOf" srcId="{E4707BE7-7EDF-4837-A35B-6A9A917707EA}" destId="{058EB57E-6CE2-6945-BF23-7F12BE3F3A1F}" srcOrd="4" destOrd="0" presId="urn:microsoft.com/office/officeart/2005/8/layout/vProcess5"/>
+    <dgm:cxn modelId="{2E03C067-E9E8-564C-9CE3-4EB283097B2E}" type="presParOf" srcId="{E4707BE7-7EDF-4837-A35B-6A9A917707EA}" destId="{15B25370-460D-374D-9F5D-0E44F6433FD6}" srcOrd="5" destOrd="0" presId="urn:microsoft.com/office/officeart/2005/8/layout/vProcess5"/>
+    <dgm:cxn modelId="{09C43A6A-DE5E-8B41-BC0A-C86ADF3018FE}" type="presParOf" srcId="{E4707BE7-7EDF-4837-A35B-6A9A917707EA}" destId="{70B98F60-66CE-054C-B160-125990959E3E}" srcOrd="6" destOrd="0" presId="urn:microsoft.com/office/officeart/2005/8/layout/vProcess5"/>
+    <dgm:cxn modelId="{B5196720-1152-A04D-89F7-D7ECE2D19C90}" type="presParOf" srcId="{E4707BE7-7EDF-4837-A35B-6A9A917707EA}" destId="{7FA9F3E3-37F8-F64F-A4D8-90EA7B9FC075}" srcOrd="7" destOrd="0" presId="urn:microsoft.com/office/officeart/2005/8/layout/vProcess5"/>
+    <dgm:cxn modelId="{3E0F111F-1E52-3247-B6AD-F09D82D15EC7}" type="presParOf" srcId="{E4707BE7-7EDF-4837-A35B-6A9A917707EA}" destId="{C5D185D8-0EF4-0C45-BBC3-C8D2341A1B13}" srcOrd="8" destOrd="0" presId="urn:microsoft.com/office/officeart/2005/8/layout/vProcess5"/>
+    <dgm:cxn modelId="{4CC951D9-E16C-4847-919F-101DEFD8ADD7}" type="presParOf" srcId="{E4707BE7-7EDF-4837-A35B-6A9A917707EA}" destId="{486BFA6B-169E-E04B-B7C2-04D8230B03E7}" srcOrd="9" destOrd="0" presId="urn:microsoft.com/office/officeart/2005/8/layout/vProcess5"/>
+    <dgm:cxn modelId="{28E2D772-8003-B14C-9AD1-01F7E481801B}" type="presParOf" srcId="{E4707BE7-7EDF-4837-A35B-6A9A917707EA}" destId="{92F9DF7F-BE4D-5D42-980D-3F70EFAA613C}" srcOrd="10" destOrd="0" presId="urn:microsoft.com/office/officeart/2005/8/layout/vProcess5"/>
+    <dgm:cxn modelId="{67446A68-CD70-9E4A-8CF2-7B050A8A9837}" type="presParOf" srcId="{E4707BE7-7EDF-4837-A35B-6A9A917707EA}" destId="{93DC7F84-213F-3545-ACDC-119223231611}" srcOrd="11" destOrd="0" presId="urn:microsoft.com/office/officeart/2005/8/layout/vProcess5"/>
+    <dgm:cxn modelId="{A8F01C0F-742E-FB4A-996E-01A16E905FFD}" type="presParOf" srcId="{E4707BE7-7EDF-4837-A35B-6A9A917707EA}" destId="{3143FD0A-99A3-234B-A197-8BAC0FA644EF}" srcOrd="12" destOrd="0" presId="urn:microsoft.com/office/officeart/2005/8/layout/vProcess5"/>
+    <dgm:cxn modelId="{3CC224BD-2BE9-B64A-913E-E205CECF2A15}" type="presParOf" srcId="{E4707BE7-7EDF-4837-A35B-6A9A917707EA}" destId="{CD8D60EC-1228-DA43-818B-EC2B32870941}" srcOrd="13" destOrd="0" presId="urn:microsoft.com/office/officeart/2005/8/layout/vProcess5"/>
+    <dgm:cxn modelId="{0A453D83-2F45-AB4C-BD4A-16E5C30C9320}" type="presParOf" srcId="{E4707BE7-7EDF-4837-A35B-6A9A917707EA}" destId="{1ADE09CF-528D-8A4F-BD38-C8CFDC19893A}" srcOrd="14" destOrd="0" presId="urn:microsoft.com/office/officeart/2005/8/layout/vProcess5"/>
   </dgm:cxnLst>
   <dgm:bg/>
   <dgm:whole/>
@@ -1227,7 +1302,7 @@
       <dsp:cNvGrpSpPr/>
     </dsp:nvGrpSpPr>
     <dsp:grpSpPr/>
-    <dsp:sp modelId="{C2779C57-EEC1-4CE4-AF65-7F151945A742}">
+    <dsp:sp modelId="{1E3B8D16-C4F7-BB41-AA0D-C94E4247F00A}">
       <dsp:nvSpPr>
         <dsp:cNvPr id="0" name=""/>
         <dsp:cNvSpPr/>
@@ -1235,7 +1310,7 @@
       <dsp:spPr>
         <a:xfrm>
           <a:off x="0" y="0"/>
-          <a:ext cx="8046720" cy="832937"/>
+          <a:ext cx="7744967" cy="681494"/>
         </a:xfrm>
         <a:prstGeom prst="roundRect">
           <a:avLst>
@@ -1278,12 +1353,12 @@
         </a:fontRef>
       </dsp:style>
       <dsp:txBody>
-        <a:bodyPr spcFirstLastPara="0" vert="horz" wrap="square" lIns="137160" tIns="137160" rIns="137160" bIns="137160" numCol="1" spcCol="1270" anchor="ctr" anchorCtr="0">
+        <a:bodyPr spcFirstLastPara="0" vert="horz" wrap="square" lIns="110490" tIns="110490" rIns="110490" bIns="110490" numCol="1" spcCol="1270" anchor="ctr" anchorCtr="0">
           <a:noAutofit/>
         </a:bodyPr>
         <a:lstStyle/>
         <a:p>
-          <a:pPr marL="0" lvl="0" indent="0" algn="l" defTabSz="1600200">
+          <a:pPr marL="0" lvl="0" indent="0" algn="l" defTabSz="1289050">
             <a:lnSpc>
               <a:spcPct val="90000"/>
             </a:lnSpc>
@@ -1296,26 +1371,25 @@
             <a:buNone/>
           </a:pPr>
           <a:r>
-            <a:rPr lang="en-US" sz="3600" kern="1200" baseline="0"/>
-            <a:t>Usecase Diagram</a:t>
+            <a:rPr lang="en-US" sz="2900" kern="1200" dirty="0"/>
+            <a:t>Application Architecture</a:t>
           </a:r>
-          <a:endParaRPr lang="en-US" sz="3600" kern="1200"/>
         </a:p>
       </dsp:txBody>
       <dsp:txXfrm>
-        <a:off x="24396" y="24396"/>
-        <a:ext cx="7077531" cy="784145"/>
+        <a:off x="19960" y="19960"/>
+        <a:ext cx="6929848" cy="641574"/>
       </dsp:txXfrm>
     </dsp:sp>
-    <dsp:sp modelId="{2ABE2EAF-269E-49D9-AC64-286BFABA70BC}">
+    <dsp:sp modelId="{FF063622-72C9-ED4F-BA28-EEEBB15FF303}">
       <dsp:nvSpPr>
         <dsp:cNvPr id="0" name=""/>
         <dsp:cNvSpPr/>
       </dsp:nvSpPr>
       <dsp:spPr>
         <a:xfrm>
-          <a:off x="673912" y="984380"/>
-          <a:ext cx="8046720" cy="832937"/>
+          <a:off x="578358" y="776146"/>
+          <a:ext cx="7744967" cy="681494"/>
         </a:xfrm>
         <a:prstGeom prst="roundRect">
           <a:avLst>
@@ -1324,9 +1398,9 @@
         </a:prstGeom>
         <a:solidFill>
           <a:schemeClr val="accent2">
-            <a:hueOff val="13013"/>
-            <a:satOff val="-8959"/>
-            <a:lumOff val="-2288"/>
+            <a:hueOff val="9759"/>
+            <a:satOff val="-6719"/>
+            <a:lumOff val="-1716"/>
             <a:alphaOff val="0"/>
           </a:schemeClr>
         </a:solidFill>
@@ -1358,12 +1432,12 @@
         </a:fontRef>
       </dsp:style>
       <dsp:txBody>
-        <a:bodyPr spcFirstLastPara="0" vert="horz" wrap="square" lIns="137160" tIns="137160" rIns="137160" bIns="137160" numCol="1" spcCol="1270" anchor="ctr" anchorCtr="0">
+        <a:bodyPr spcFirstLastPara="0" vert="horz" wrap="square" lIns="110490" tIns="110490" rIns="110490" bIns="110490" numCol="1" spcCol="1270" anchor="ctr" anchorCtr="0">
           <a:noAutofit/>
         </a:bodyPr>
         <a:lstStyle/>
         <a:p>
-          <a:pPr marL="0" lvl="0" indent="0" algn="l" defTabSz="1600200">
+          <a:pPr marL="0" lvl="0" indent="0" algn="l" defTabSz="1289050">
             <a:lnSpc>
               <a:spcPct val="90000"/>
             </a:lnSpc>
@@ -1376,26 +1450,30 @@
             <a:buNone/>
           </a:pPr>
           <a:r>
-            <a:rPr lang="en-US" sz="3600" kern="1200" baseline="0"/>
-            <a:t>Class Diagram</a:t>
+            <a:rPr lang="en-US" sz="2900" kern="1200" baseline="0" dirty="0" err="1"/>
+            <a:t>Usecase</a:t>
           </a:r>
-          <a:endParaRPr lang="en-US" sz="3600" kern="1200"/>
+          <a:r>
+            <a:rPr lang="en-US" sz="2900" kern="1200" baseline="0" dirty="0"/>
+            <a:t> Diagram</a:t>
+          </a:r>
+          <a:endParaRPr lang="en-US" sz="2900" kern="1200" dirty="0"/>
         </a:p>
       </dsp:txBody>
       <dsp:txXfrm>
-        <a:off x="698308" y="1008776"/>
-        <a:ext cx="6782605" cy="784145"/>
+        <a:off x="598318" y="796106"/>
+        <a:ext cx="6683718" cy="641574"/>
       </dsp:txXfrm>
     </dsp:sp>
-    <dsp:sp modelId="{FD3EBF0A-CFBA-4E8F-9E11-F76E14037496}">
+    <dsp:sp modelId="{8BAE6423-0C5E-A045-95D1-A5D78D0DB807}">
       <dsp:nvSpPr>
         <dsp:cNvPr id="0" name=""/>
         <dsp:cNvSpPr/>
       </dsp:nvSpPr>
       <dsp:spPr>
         <a:xfrm>
-          <a:off x="1337767" y="1968761"/>
-          <a:ext cx="8046720" cy="832937"/>
+          <a:off x="1156716" y="1552292"/>
+          <a:ext cx="7744967" cy="681494"/>
         </a:xfrm>
         <a:prstGeom prst="roundRect">
           <a:avLst>
@@ -1404,9 +1482,9 @@
         </a:prstGeom>
         <a:solidFill>
           <a:schemeClr val="accent2">
-            <a:hueOff val="26025"/>
-            <a:satOff val="-17917"/>
-            <a:lumOff val="-4575"/>
+            <a:hueOff val="19519"/>
+            <a:satOff val="-13438"/>
+            <a:lumOff val="-3431"/>
             <a:alphaOff val="0"/>
           </a:schemeClr>
         </a:solidFill>
@@ -1438,12 +1516,12 @@
         </a:fontRef>
       </dsp:style>
       <dsp:txBody>
-        <a:bodyPr spcFirstLastPara="0" vert="horz" wrap="square" lIns="137160" tIns="137160" rIns="137160" bIns="137160" numCol="1" spcCol="1270" anchor="ctr" anchorCtr="0">
+        <a:bodyPr spcFirstLastPara="0" vert="horz" wrap="square" lIns="110490" tIns="110490" rIns="110490" bIns="110490" numCol="1" spcCol="1270" anchor="ctr" anchorCtr="0">
           <a:noAutofit/>
         </a:bodyPr>
         <a:lstStyle/>
         <a:p>
-          <a:pPr marL="0" lvl="0" indent="0" algn="l" defTabSz="1600200">
+          <a:pPr marL="0" lvl="0" indent="0" algn="l" defTabSz="1289050">
             <a:lnSpc>
               <a:spcPct val="90000"/>
             </a:lnSpc>
@@ -1456,26 +1534,106 @@
             <a:buNone/>
           </a:pPr>
           <a:r>
-            <a:rPr lang="en-US" sz="3600" kern="1200" baseline="0"/>
-            <a:t>Sequence Diagram</a:t>
+            <a:rPr lang="en-US" sz="2900" kern="1200" baseline="0"/>
+            <a:t>Class Diagram</a:t>
           </a:r>
-          <a:endParaRPr lang="en-US" sz="3600" kern="1200"/>
+          <a:endParaRPr lang="en-US" sz="2900" kern="1200"/>
         </a:p>
       </dsp:txBody>
       <dsp:txXfrm>
-        <a:off x="1362163" y="1993157"/>
-        <a:ext cx="6792664" cy="784145"/>
+        <a:off x="1176676" y="1572252"/>
+        <a:ext cx="6683718" cy="641574"/>
       </dsp:txXfrm>
     </dsp:sp>
-    <dsp:sp modelId="{6199B417-0D6C-4F24-B767-9CC7E89A35A0}">
+    <dsp:sp modelId="{058EB57E-6CE2-6945-BF23-7F12BE3F3A1F}">
       <dsp:nvSpPr>
         <dsp:cNvPr id="0" name=""/>
         <dsp:cNvSpPr/>
       </dsp:nvSpPr>
       <dsp:spPr>
         <a:xfrm>
-          <a:off x="2011680" y="2953142"/>
-          <a:ext cx="8046720" cy="832937"/>
+          <a:off x="1735073" y="2328439"/>
+          <a:ext cx="7744967" cy="681494"/>
+        </a:xfrm>
+        <a:prstGeom prst="roundRect">
+          <a:avLst>
+            <a:gd name="adj" fmla="val 10000"/>
+          </a:avLst>
+        </a:prstGeom>
+        <a:solidFill>
+          <a:schemeClr val="accent2">
+            <a:hueOff val="29278"/>
+            <a:satOff val="-20157"/>
+            <a:lumOff val="-5147"/>
+            <a:alphaOff val="0"/>
+          </a:schemeClr>
+        </a:solidFill>
+        <a:ln w="15875" cap="flat" cmpd="sng" algn="ctr">
+          <a:solidFill>
+            <a:schemeClr val="lt1">
+              <a:hueOff val="0"/>
+              <a:satOff val="0"/>
+              <a:lumOff val="0"/>
+              <a:alphaOff val="0"/>
+            </a:schemeClr>
+          </a:solidFill>
+          <a:prstDash val="solid"/>
+        </a:ln>
+        <a:effectLst/>
+      </dsp:spPr>
+      <dsp:style>
+        <a:lnRef idx="2">
+          <a:scrgbClr r="0" g="0" b="0"/>
+        </a:lnRef>
+        <a:fillRef idx="1">
+          <a:scrgbClr r="0" g="0" b="0"/>
+        </a:fillRef>
+        <a:effectRef idx="0">
+          <a:scrgbClr r="0" g="0" b="0"/>
+        </a:effectRef>
+        <a:fontRef idx="minor">
+          <a:schemeClr val="lt1"/>
+        </a:fontRef>
+      </dsp:style>
+      <dsp:txBody>
+        <a:bodyPr spcFirstLastPara="0" vert="horz" wrap="square" lIns="110490" tIns="110490" rIns="110490" bIns="110490" numCol="1" spcCol="1270" anchor="ctr" anchorCtr="0">
+          <a:noAutofit/>
+        </a:bodyPr>
+        <a:lstStyle/>
+        <a:p>
+          <a:pPr marL="0" lvl="0" indent="0" algn="l" defTabSz="1289050">
+            <a:lnSpc>
+              <a:spcPct val="90000"/>
+            </a:lnSpc>
+            <a:spcBef>
+              <a:spcPct val="0"/>
+            </a:spcBef>
+            <a:spcAft>
+              <a:spcPct val="35000"/>
+            </a:spcAft>
+            <a:buNone/>
+          </a:pPr>
+          <a:r>
+            <a:rPr lang="en-US" sz="2900" kern="1200" baseline="0"/>
+            <a:t>Sequence Diagram</a:t>
+          </a:r>
+          <a:endParaRPr lang="en-US" sz="2900" kern="1200"/>
+        </a:p>
+      </dsp:txBody>
+      <dsp:txXfrm>
+        <a:off x="1755033" y="2348399"/>
+        <a:ext cx="6683718" cy="641574"/>
+      </dsp:txXfrm>
+    </dsp:sp>
+    <dsp:sp modelId="{15B25370-460D-374D-9F5D-0E44F6433FD6}">
+      <dsp:nvSpPr>
+        <dsp:cNvPr id="0" name=""/>
+        <dsp:cNvSpPr/>
+      </dsp:nvSpPr>
+      <dsp:spPr>
+        <a:xfrm>
+          <a:off x="2313432" y="3104585"/>
+          <a:ext cx="7744967" cy="681494"/>
         </a:xfrm>
         <a:prstGeom prst="roundRect">
           <a:avLst>
@@ -1518,12 +1676,12 @@
         </a:fontRef>
       </dsp:style>
       <dsp:txBody>
-        <a:bodyPr spcFirstLastPara="0" vert="horz" wrap="square" lIns="137160" tIns="137160" rIns="137160" bIns="137160" numCol="1" spcCol="1270" anchor="ctr" anchorCtr="0">
+        <a:bodyPr spcFirstLastPara="0" vert="horz" wrap="square" lIns="110490" tIns="110490" rIns="110490" bIns="110490" numCol="1" spcCol="1270" anchor="ctr" anchorCtr="0">
           <a:noAutofit/>
         </a:bodyPr>
         <a:lstStyle/>
         <a:p>
-          <a:pPr marL="0" lvl="0" indent="0" algn="l" defTabSz="1600200">
+          <a:pPr marL="0" lvl="0" indent="0" algn="l" defTabSz="1289050">
             <a:lnSpc>
               <a:spcPct val="90000"/>
             </a:lnSpc>
@@ -1536,26 +1694,26 @@
             <a:buNone/>
           </a:pPr>
           <a:r>
-            <a:rPr lang="en-US" sz="3600" kern="1200" baseline="0"/>
+            <a:rPr lang="en-US" sz="2900" kern="1200" baseline="0"/>
             <a:t>Demo </a:t>
           </a:r>
-          <a:endParaRPr lang="en-US" sz="3600" kern="1200"/>
+          <a:endParaRPr lang="en-US" sz="2900" kern="1200"/>
         </a:p>
       </dsp:txBody>
       <dsp:txXfrm>
-        <a:off x="2036076" y="2977538"/>
-        <a:ext cx="6782605" cy="784145"/>
+        <a:off x="2333392" y="3124545"/>
+        <a:ext cx="6683718" cy="641574"/>
       </dsp:txXfrm>
     </dsp:sp>
-    <dsp:sp modelId="{46D3AC0B-090B-44E8-B5DA-ED3649F14CC4}">
+    <dsp:sp modelId="{70B98F60-66CE-054C-B160-125990959E3E}">
       <dsp:nvSpPr>
         <dsp:cNvPr id="0" name=""/>
         <dsp:cNvSpPr/>
       </dsp:nvSpPr>
       <dsp:spPr>
         <a:xfrm>
-          <a:off x="7505310" y="637954"/>
-          <a:ext cx="541409" cy="541409"/>
+          <a:off x="7301996" y="497869"/>
+          <a:ext cx="442971" cy="442971"/>
         </a:xfrm>
         <a:prstGeom prst="downArrow">
           <a:avLst>
@@ -1601,12 +1759,12 @@
         <a:fontRef idx="minor"/>
       </dsp:style>
       <dsp:txBody>
-        <a:bodyPr spcFirstLastPara="0" vert="horz" wrap="square" lIns="30480" tIns="30480" rIns="30480" bIns="30480" numCol="1" spcCol="1270" anchor="ctr" anchorCtr="0">
+        <a:bodyPr spcFirstLastPara="0" vert="horz" wrap="square" lIns="25400" tIns="25400" rIns="25400" bIns="25400" numCol="1" spcCol="1270" anchor="ctr" anchorCtr="0">
           <a:noAutofit/>
         </a:bodyPr>
         <a:lstStyle/>
         <a:p>
-          <a:pPr marL="0" lvl="0" indent="0" algn="ctr" defTabSz="1066800">
+          <a:pPr marL="0" lvl="0" indent="0" algn="ctr" defTabSz="889000">
             <a:lnSpc>
               <a:spcPct val="90000"/>
             </a:lnSpc>
@@ -1618,23 +1776,23 @@
             </a:spcAft>
             <a:buNone/>
           </a:pPr>
-          <a:endParaRPr lang="en-US" sz="2400" kern="1200"/>
+          <a:endParaRPr lang="en-US" sz="2000" kern="1200"/>
         </a:p>
       </dsp:txBody>
       <dsp:txXfrm>
-        <a:off x="7627127" y="637954"/>
-        <a:ext cx="297775" cy="407410"/>
+        <a:off x="7401664" y="497869"/>
+        <a:ext cx="243635" cy="333336"/>
       </dsp:txXfrm>
     </dsp:sp>
-    <dsp:sp modelId="{358B1A01-870F-4CA9-916D-154B0DEDF13D}">
+    <dsp:sp modelId="{7FA9F3E3-37F8-F64F-A4D8-90EA7B9FC075}">
       <dsp:nvSpPr>
         <dsp:cNvPr id="0" name=""/>
         <dsp:cNvSpPr/>
       </dsp:nvSpPr>
       <dsp:spPr>
         <a:xfrm>
-          <a:off x="8179223" y="1622335"/>
-          <a:ext cx="541409" cy="541409"/>
+          <a:off x="7880354" y="1274015"/>
+          <a:ext cx="442971" cy="442971"/>
         </a:xfrm>
         <a:prstGeom prst="downArrow">
           <a:avLst>
@@ -1646,9 +1804,9 @@
           <a:schemeClr val="accent2">
             <a:tint val="40000"/>
             <a:alpha val="90000"/>
-            <a:hueOff val="123599"/>
-            <a:satOff val="-11908"/>
-            <a:lumOff val="-1255"/>
+            <a:hueOff val="82399"/>
+            <a:satOff val="-7939"/>
+            <a:lumOff val="-837"/>
             <a:alphaOff val="0"/>
           </a:schemeClr>
         </a:solidFill>
@@ -1657,9 +1815,9 @@
             <a:schemeClr val="accent2">
               <a:tint val="40000"/>
               <a:alpha val="90000"/>
-              <a:hueOff val="123599"/>
-              <a:satOff val="-11908"/>
-              <a:lumOff val="-1255"/>
+              <a:hueOff val="82399"/>
+              <a:satOff val="-7939"/>
+              <a:lumOff val="-837"/>
               <a:alphaOff val="0"/>
             </a:schemeClr>
           </a:solidFill>
@@ -1680,12 +1838,12 @@
         <a:fontRef idx="minor"/>
       </dsp:style>
       <dsp:txBody>
-        <a:bodyPr spcFirstLastPara="0" vert="horz" wrap="square" lIns="30480" tIns="30480" rIns="30480" bIns="30480" numCol="1" spcCol="1270" anchor="ctr" anchorCtr="0">
+        <a:bodyPr spcFirstLastPara="0" vert="horz" wrap="square" lIns="25400" tIns="25400" rIns="25400" bIns="25400" numCol="1" spcCol="1270" anchor="ctr" anchorCtr="0">
           <a:noAutofit/>
         </a:bodyPr>
         <a:lstStyle/>
         <a:p>
-          <a:pPr marL="0" lvl="0" indent="0" algn="ctr" defTabSz="1066800">
+          <a:pPr marL="0" lvl="0" indent="0" algn="ctr" defTabSz="889000">
             <a:lnSpc>
               <a:spcPct val="90000"/>
             </a:lnSpc>
@@ -1697,23 +1855,102 @@
             </a:spcAft>
             <a:buNone/>
           </a:pPr>
-          <a:endParaRPr lang="en-US" sz="2400" kern="1200"/>
+          <a:endParaRPr lang="en-US" sz="2000" kern="1200"/>
         </a:p>
       </dsp:txBody>
       <dsp:txXfrm>
-        <a:off x="8301040" y="1622335"/>
-        <a:ext cx="297775" cy="407410"/>
+        <a:off x="7980022" y="1274015"/>
+        <a:ext cx="243635" cy="333336"/>
       </dsp:txXfrm>
     </dsp:sp>
-    <dsp:sp modelId="{925D03D4-D13F-468E-8490-A59C7A5804A1}">
+    <dsp:sp modelId="{C5D185D8-0EF4-0C45-BBC3-C8D2341A1B13}">
       <dsp:nvSpPr>
         <dsp:cNvPr id="0" name=""/>
         <dsp:cNvSpPr/>
       </dsp:nvSpPr>
       <dsp:spPr>
         <a:xfrm>
-          <a:off x="8843077" y="2606716"/>
-          <a:ext cx="541409" cy="541409"/>
+          <a:off x="8458712" y="2038804"/>
+          <a:ext cx="442971" cy="442971"/>
+        </a:xfrm>
+        <a:prstGeom prst="downArrow">
+          <a:avLst>
+            <a:gd name="adj1" fmla="val 55000"/>
+            <a:gd name="adj2" fmla="val 45000"/>
+          </a:avLst>
+        </a:prstGeom>
+        <a:solidFill>
+          <a:schemeClr val="accent2">
+            <a:tint val="40000"/>
+            <a:alpha val="90000"/>
+            <a:hueOff val="164799"/>
+            <a:satOff val="-15877"/>
+            <a:lumOff val="-1674"/>
+            <a:alphaOff val="0"/>
+          </a:schemeClr>
+        </a:solidFill>
+        <a:ln w="15875" cap="flat" cmpd="sng" algn="ctr">
+          <a:solidFill>
+            <a:schemeClr val="accent2">
+              <a:tint val="40000"/>
+              <a:alpha val="90000"/>
+              <a:hueOff val="164799"/>
+              <a:satOff val="-15877"/>
+              <a:lumOff val="-1674"/>
+              <a:alphaOff val="0"/>
+            </a:schemeClr>
+          </a:solidFill>
+          <a:prstDash val="solid"/>
+        </a:ln>
+        <a:effectLst/>
+      </dsp:spPr>
+      <dsp:style>
+        <a:lnRef idx="2">
+          <a:scrgbClr r="0" g="0" b="0"/>
+        </a:lnRef>
+        <a:fillRef idx="1">
+          <a:scrgbClr r="0" g="0" b="0"/>
+        </a:fillRef>
+        <a:effectRef idx="0">
+          <a:scrgbClr r="0" g="0" b="0"/>
+        </a:effectRef>
+        <a:fontRef idx="minor"/>
+      </dsp:style>
+      <dsp:txBody>
+        <a:bodyPr spcFirstLastPara="0" vert="horz" wrap="square" lIns="25400" tIns="25400" rIns="25400" bIns="25400" numCol="1" spcCol="1270" anchor="ctr" anchorCtr="0">
+          <a:noAutofit/>
+        </a:bodyPr>
+        <a:lstStyle/>
+        <a:p>
+          <a:pPr marL="0" lvl="0" indent="0" algn="ctr" defTabSz="889000">
+            <a:lnSpc>
+              <a:spcPct val="90000"/>
+            </a:lnSpc>
+            <a:spcBef>
+              <a:spcPct val="0"/>
+            </a:spcBef>
+            <a:spcAft>
+              <a:spcPct val="35000"/>
+            </a:spcAft>
+            <a:buNone/>
+          </a:pPr>
+          <a:endParaRPr lang="en-US" sz="2000" kern="1200"/>
+        </a:p>
+      </dsp:txBody>
+      <dsp:txXfrm>
+        <a:off x="8558380" y="2038804"/>
+        <a:ext cx="243635" cy="333336"/>
+      </dsp:txXfrm>
+    </dsp:sp>
+    <dsp:sp modelId="{486BFA6B-169E-E04B-B7C2-04D8230B03E7}">
+      <dsp:nvSpPr>
+        <dsp:cNvPr id="0" name=""/>
+        <dsp:cNvSpPr/>
+      </dsp:nvSpPr>
+      <dsp:spPr>
+        <a:xfrm>
+          <a:off x="9037070" y="2822522"/>
+          <a:ext cx="442971" cy="442971"/>
         </a:xfrm>
         <a:prstGeom prst="downArrow">
           <a:avLst>
@@ -1759,12 +1996,12 @@
         <a:fontRef idx="minor"/>
       </dsp:style>
       <dsp:txBody>
-        <a:bodyPr spcFirstLastPara="0" vert="horz" wrap="square" lIns="30480" tIns="30480" rIns="30480" bIns="30480" numCol="1" spcCol="1270" anchor="ctr" anchorCtr="0">
+        <a:bodyPr spcFirstLastPara="0" vert="horz" wrap="square" lIns="25400" tIns="25400" rIns="25400" bIns="25400" numCol="1" spcCol="1270" anchor="ctr" anchorCtr="0">
           <a:noAutofit/>
         </a:bodyPr>
         <a:lstStyle/>
         <a:p>
-          <a:pPr marL="0" lvl="0" indent="0" algn="ctr" defTabSz="1066800">
+          <a:pPr marL="0" lvl="0" indent="0" algn="ctr" defTabSz="889000">
             <a:lnSpc>
               <a:spcPct val="90000"/>
             </a:lnSpc>
@@ -1776,12 +2013,12 @@
             </a:spcAft>
             <a:buNone/>
           </a:pPr>
-          <a:endParaRPr lang="en-US" sz="2400" kern="1200"/>
+          <a:endParaRPr lang="en-US" sz="2000" kern="1200"/>
         </a:p>
       </dsp:txBody>
       <dsp:txXfrm>
-        <a:off x="8964894" y="2606716"/>
-        <a:ext cx="297775" cy="407410"/>
+        <a:off x="9136738" y="2822522"/>
+        <a:ext cx="243635" cy="333336"/>
       </dsp:txXfrm>
     </dsp:sp>
   </dsp:spTree>
@@ -4130,7 +4367,7 @@
           <a:p>
             <a:fld id="{BDB16EA1-3DC5-4AD8-85AB-ACEC6E472AD8}" type="datetimeFigureOut">
               <a:rPr lang="en-US" smtClean="0"/>
-              <a:t>15/09/202323</a:t>
+              <a:t>9/16/23</a:t>
             </a:fld>
             <a:endParaRPr lang="en-US"/>
           </a:p>
@@ -4462,7 +4699,7 @@
           <a:p>
             <a:fld id="{FF04906B-C7DD-2343-9E32-24DCE4FA6C71}" type="slidenum">
               <a:rPr lang="en-US" smtClean="0"/>
-              <a:t>12</a:t>
+              <a:t>16</a:t>
             </a:fld>
             <a:endParaRPr lang="en-US"/>
           </a:p>
@@ -4707,7 +4944,7 @@
           <a:p>
             <a:fld id="{2395C5C9-164C-46B3-A87E-7660D39D3106}" type="datetime2">
               <a:rPr lang="en-US" smtClean="0"/>
-              <a:t>Friday, September 15, 2023</a:t>
+              <a:t>Saturday, September 16, 2023</a:t>
             </a:fld>
             <a:endParaRPr lang="en-US" dirty="0"/>
           </a:p>
@@ -4920,7 +5157,7 @@
           <a:p>
             <a:fld id="{5B75179A-1E2B-41AB-B400-4F1B4022FAEE}" type="datetime2">
               <a:rPr lang="en-US" smtClean="0"/>
-              <a:t>Friday, September 15, 2023</a:t>
+              <a:t>Saturday, September 16, 2023</a:t>
             </a:fld>
             <a:endParaRPr lang="en-US"/>
           </a:p>
@@ -5179,7 +5416,7 @@
           <a:p>
             <a:fld id="{05681D0F-6595-4F14-8EF3-954CD87C797B}" type="datetime2">
               <a:rPr lang="en-US" smtClean="0"/>
-              <a:t>Friday, September 15, 2023</a:t>
+              <a:t>Saturday, September 16, 2023</a:t>
             </a:fld>
             <a:endParaRPr lang="en-US"/>
           </a:p>
@@ -5356,7 +5593,7 @@
           <a:p>
             <a:fld id="{4DDCFF8A-AAF8-4A12-8A91-9CA0EAF6CBB9}" type="datetime2">
               <a:rPr lang="en-US" smtClean="0"/>
-              <a:t>Friday, September 15, 2023</a:t>
+              <a:t>Saturday, September 16, 2023</a:t>
             </a:fld>
             <a:endParaRPr lang="en-US" dirty="0"/>
           </a:p>
@@ -5704,7 +5941,7 @@
           <a:p>
             <a:fld id="{ABCC25C3-021A-4B0B-8F70-0C181FE1CF45}" type="datetime2">
               <a:rPr lang="en-US" smtClean="0"/>
-              <a:t>Friday, September 15, 2023</a:t>
+              <a:t>Saturday, September 16, 2023</a:t>
             </a:fld>
             <a:endParaRPr lang="en-US"/>
           </a:p>
@@ -5984,7 +6221,7 @@
           <a:p>
             <a:fld id="{0C23D88D-8CEC-4ED9-A53B-5596187D9A16}" type="datetime2">
               <a:rPr lang="en-US" smtClean="0"/>
-              <a:t>Friday, September 15, 2023</a:t>
+              <a:t>Saturday, September 16, 2023</a:t>
             </a:fld>
             <a:endParaRPr lang="en-US"/>
           </a:p>
@@ -6366,7 +6603,7 @@
           <a:p>
             <a:fld id="{D2CCD382-DFDA-4722-A27A-59C21AD112F2}" type="datetime2">
               <a:rPr lang="en-US" smtClean="0"/>
-              <a:t>Friday, September 15, 2023</a:t>
+              <a:t>Saturday, September 16, 2023</a:t>
             </a:fld>
             <a:endParaRPr lang="en-US"/>
           </a:p>
@@ -6487,7 +6724,7 @@
           <a:p>
             <a:fld id="{22F2A30D-1C09-413F-AAB1-38F366000715}" type="datetime2">
               <a:rPr lang="en-US" smtClean="0"/>
-              <a:t>Friday, September 15, 2023</a:t>
+              <a:t>Saturday, September 16, 2023</a:t>
             </a:fld>
             <a:endParaRPr lang="en-US"/>
           </a:p>
@@ -6661,7 +6898,7 @@
           <a:p>
             <a:fld id="{6DB82B9C-D65E-4F64-95C3-B10F3B00F0D9}" type="datetime2">
               <a:rPr lang="en-US" smtClean="0"/>
-              <a:t>Friday, September 15, 2023</a:t>
+              <a:t>Saturday, September 16, 2023</a:t>
             </a:fld>
             <a:endParaRPr lang="en-US"/>
           </a:p>
@@ -7018,7 +7255,7 @@
           <a:p>
             <a:fld id="{B7F5FDCC-6AAC-4A08-B9E0-3793AB5E64C3}" type="datetime2">
               <a:rPr lang="en-US" smtClean="0"/>
-              <a:t>Friday, September 15, 2023</a:t>
+              <a:t>Saturday, September 16, 2023</a:t>
             </a:fld>
             <a:endParaRPr lang="en-US"/>
           </a:p>
@@ -7403,7 +7640,7 @@
           <a:p>
             <a:fld id="{349FE94D-439C-40F1-900E-BC07940E3988}" type="datetime2">
               <a:rPr lang="en-US" smtClean="0"/>
-              <a:t>Friday, September 15, 2023</a:t>
+              <a:t>Saturday, September 16, 2023</a:t>
             </a:fld>
             <a:endParaRPr lang="en-US"/>
           </a:p>
@@ -7693,7 +7930,7 @@
           <a:p>
             <a:fld id="{8DEA2CF1-0EB2-4673-802D-3371233E4A77}" type="datetime2">
               <a:rPr lang="en-US" smtClean="0"/>
-              <a:t>Friday, September 15, 2023</a:t>
+              <a:t>Saturday, September 16, 2023</a:t>
             </a:fld>
             <a:endParaRPr lang="en-US" dirty="0"/>
           </a:p>
@@ -8817,6 +9054,814 @@
       </p:grpSpPr>
       <p:sp>
         <p:nvSpPr>
+          <p:cNvPr id="2" name="Title 1">
+            <a:extLst>
+              <a:ext uri="{FF2B5EF4-FFF2-40B4-BE49-F238E27FC236}">
+                <a16:creationId xmlns:a16="http://schemas.microsoft.com/office/drawing/2014/main" id="{6892F569-65D6-A2F3-AFB7-C985B055A2BC}"/>
+              </a:ext>
+            </a:extLst>
+          </p:cNvPr>
+          <p:cNvSpPr>
+            <a:spLocks noGrp="1"/>
+          </p:cNvSpPr>
+          <p:nvPr>
+            <p:ph type="title"/>
+          </p:nvPr>
+        </p:nvSpPr>
+        <p:spPr/>
+        <p:txBody>
+          <a:bodyPr/>
+          <a:lstStyle/>
+          <a:p>
+            <a:r>
+              <a:rPr lang="en-US" dirty="0" err="1"/>
+              <a:t>Usecase</a:t>
+            </a:r>
+            <a:r>
+              <a:rPr lang="en-US" dirty="0"/>
+              <a:t> Description: Add Book </a:t>
+            </a:r>
+          </a:p>
+        </p:txBody>
+      </p:sp>
+      <p:graphicFrame>
+        <p:nvGraphicFramePr>
+          <p:cNvPr id="4" name="Table 7">
+            <a:extLst>
+              <a:ext uri="{FF2B5EF4-FFF2-40B4-BE49-F238E27FC236}">
+                <a16:creationId xmlns:a16="http://schemas.microsoft.com/office/drawing/2014/main" id="{CCF1B50C-EA8F-1133-D409-284A60E342F6}"/>
+              </a:ext>
+            </a:extLst>
+          </p:cNvPr>
+          <p:cNvGraphicFramePr>
+            <a:graphicFrameLocks/>
+          </p:cNvGraphicFramePr>
+          <p:nvPr>
+            <p:extLst>
+              <p:ext uri="{D42A27DB-BD31-4B8C-83A1-F6EECF244321}">
+                <p14:modId xmlns:p14="http://schemas.microsoft.com/office/powerpoint/2010/main" val="2033133299"/>
+              </p:ext>
+            </p:extLst>
+          </p:nvPr>
+        </p:nvGraphicFramePr>
+        <p:xfrm>
+          <a:off x="906780" y="1897056"/>
+          <a:ext cx="10378441" cy="3063888"/>
+        </p:xfrm>
+        <a:graphic>
+          <a:graphicData uri="http://schemas.openxmlformats.org/drawingml/2006/table">
+            <a:tbl>
+              <a:tblPr firstRow="1" bandRow="1">
+                <a:tableStyleId>{5C22544A-7EE6-4342-B048-85BDC9FD1C3A}</a:tableStyleId>
+              </a:tblPr>
+              <a:tblGrid>
+                <a:gridCol w="5045685">
+                  <a:extLst>
+                    <a:ext uri="{9D8B030D-6E8A-4147-A177-3AD203B41FA5}">
+                      <a16:colId xmlns:a16="http://schemas.microsoft.com/office/drawing/2014/main" val="3138249905"/>
+                    </a:ext>
+                  </a:extLst>
+                </a:gridCol>
+                <a:gridCol w="5332756">
+                  <a:extLst>
+                    <a:ext uri="{9D8B030D-6E8A-4147-A177-3AD203B41FA5}">
+                      <a16:colId xmlns:a16="http://schemas.microsoft.com/office/drawing/2014/main" val="2553994940"/>
+                    </a:ext>
+                  </a:extLst>
+                </a:gridCol>
+              </a:tblGrid>
+              <a:tr h="534965">
+                <a:tc>
+                  <a:txBody>
+                    <a:bodyPr/>
+                    <a:lstStyle/>
+                    <a:p>
+                      <a:r>
+                        <a:rPr lang="en-US" sz="2400" dirty="0"/>
+                        <a:t>User Action</a:t>
+                      </a:r>
+                    </a:p>
+                  </a:txBody>
+                  <a:tcPr marL="121583" marR="121583" marT="60791" marB="60791"/>
+                </a:tc>
+                <a:tc>
+                  <a:txBody>
+                    <a:bodyPr/>
+                    <a:lstStyle/>
+                    <a:p>
+                      <a:r>
+                        <a:rPr lang="en-US" sz="2400" dirty="0"/>
+                        <a:t>System Response</a:t>
+                      </a:r>
+                    </a:p>
+                  </a:txBody>
+                  <a:tcPr marL="121583" marR="121583" marT="60791" marB="60791"/>
+                </a:tc>
+                <a:extLst>
+                  <a:ext uri="{0D108BD9-81ED-4DB2-BD59-A6C34878D82A}">
+                    <a16:rowId xmlns:a16="http://schemas.microsoft.com/office/drawing/2014/main" val="3952563860"/>
+                  </a:ext>
+                </a:extLst>
+              </a:tr>
+              <a:tr h="899713">
+                <a:tc>
+                  <a:txBody>
+                    <a:bodyPr/>
+                    <a:lstStyle/>
+                    <a:p>
+                      <a:r>
+                        <a:rPr lang="en-US" sz="2400" dirty="0"/>
+                        <a:t>User clicks on Add book button</a:t>
+                      </a:r>
+                    </a:p>
+                  </a:txBody>
+                  <a:tcPr marL="121583" marR="121583" marT="60791" marB="60791"/>
+                </a:tc>
+                <a:tc>
+                  <a:txBody>
+                    <a:bodyPr/>
+                    <a:lstStyle/>
+                    <a:p>
+                      <a:r>
+                        <a:rPr lang="en-US" sz="2400" dirty="0"/>
+                        <a:t>System opens the Add Book dialog</a:t>
+                      </a:r>
+                    </a:p>
+                  </a:txBody>
+                  <a:tcPr marL="121583" marR="121583" marT="60791" marB="60791"/>
+                </a:tc>
+                <a:extLst>
+                  <a:ext uri="{0D108BD9-81ED-4DB2-BD59-A6C34878D82A}">
+                    <a16:rowId xmlns:a16="http://schemas.microsoft.com/office/drawing/2014/main" val="1121593986"/>
+                  </a:ext>
+                </a:extLst>
+              </a:tr>
+              <a:tr h="1629210">
+                <a:tc>
+                  <a:txBody>
+                    <a:bodyPr/>
+                    <a:lstStyle/>
+                    <a:p>
+                      <a:r>
+                        <a:rPr lang="en-US" sz="2400" dirty="0"/>
+                        <a:t>User inputs all the fields and clicks on submit button</a:t>
+                      </a:r>
+                    </a:p>
+                  </a:txBody>
+                  <a:tcPr marL="121583" marR="121583" marT="60791" marB="60791"/>
+                </a:tc>
+                <a:tc>
+                  <a:txBody>
+                    <a:bodyPr/>
+                    <a:lstStyle/>
+                    <a:p>
+                      <a:r>
+                        <a:rPr lang="en-US" sz="2400" dirty="0"/>
+                        <a:t>System validates all the fields, if all the fields are valid then add a new book and close the dialog.</a:t>
+                      </a:r>
+                    </a:p>
+                  </a:txBody>
+                  <a:tcPr marL="121583" marR="121583" marT="60791" marB="60791"/>
+                </a:tc>
+                <a:extLst>
+                  <a:ext uri="{0D108BD9-81ED-4DB2-BD59-A6C34878D82A}">
+                    <a16:rowId xmlns:a16="http://schemas.microsoft.com/office/drawing/2014/main" val="2507440164"/>
+                  </a:ext>
+                </a:extLst>
+              </a:tr>
+            </a:tbl>
+          </a:graphicData>
+        </a:graphic>
+      </p:graphicFrame>
+      <p:sp>
+        <p:nvSpPr>
+          <p:cNvPr id="5" name="Rectangle 4">
+            <a:extLst>
+              <a:ext uri="{FF2B5EF4-FFF2-40B4-BE49-F238E27FC236}">
+                <a16:creationId xmlns:a16="http://schemas.microsoft.com/office/drawing/2014/main" id="{4C462DB1-ADC3-7485-E4CE-022B25BCB229}"/>
+              </a:ext>
+            </a:extLst>
+          </p:cNvPr>
+          <p:cNvSpPr/>
+          <p:nvPr/>
+        </p:nvSpPr>
+        <p:spPr>
+          <a:xfrm>
+            <a:off x="4194258" y="6217249"/>
+            <a:ext cx="4540475" cy="769441"/>
+          </a:xfrm>
+          <a:prstGeom prst="rect">
+            <a:avLst/>
+          </a:prstGeom>
+          <a:noFill/>
+        </p:spPr>
+        <p:txBody>
+          <a:bodyPr wrap="none" lIns="91440" tIns="45720" rIns="91440" bIns="45720">
+            <a:spAutoFit/>
+          </a:bodyPr>
+          <a:lstStyle/>
+          <a:p>
+            <a:pPr algn="ctr"/>
+            <a:r>
+              <a:rPr lang="en-US" sz="4400" b="1" cap="none" spc="0" dirty="0">
+                <a:ln w="10160">
+                  <a:solidFill>
+                    <a:schemeClr val="accent5"/>
+                  </a:solidFill>
+                  <a:prstDash val="solid"/>
+                </a:ln>
+                <a:solidFill>
+                  <a:srgbClr val="FFFFFF"/>
+                </a:solidFill>
+                <a:effectLst>
+                  <a:outerShdw blurRad="38100" dist="22860" dir="5400000" algn="tl" rotWithShape="0">
+                    <a:srgbClr val="000000">
+                      <a:alpha val="30000"/>
+                    </a:srgbClr>
+                  </a:outerShdw>
+                </a:effectLst>
+              </a:rPr>
+              <a:t>Sequence Diagram</a:t>
+            </a:r>
+          </a:p>
+        </p:txBody>
+      </p:sp>
+    </p:spTree>
+    <p:extLst>
+      <p:ext uri="{BB962C8B-B14F-4D97-AF65-F5344CB8AC3E}">
+        <p14:creationId xmlns:p14="http://schemas.microsoft.com/office/powerpoint/2010/main" val="3826020683"/>
+      </p:ext>
+    </p:extLst>
+  </p:cSld>
+  <p:clrMapOvr>
+    <a:masterClrMapping/>
+  </p:clrMapOvr>
+</p:sld>
+</file>
+
+<file path=ppt/slides/slide11.xml><?xml version="1.0" encoding="utf-8"?>
+<p:sld xmlns:a="http://schemas.openxmlformats.org/drawingml/2006/main" xmlns:r="http://schemas.openxmlformats.org/officeDocument/2006/relationships" xmlns:p="http://schemas.openxmlformats.org/presentationml/2006/main">
+  <p:cSld>
+    <p:spTree>
+      <p:nvGrpSpPr>
+        <p:cNvPr id="1" name=""/>
+        <p:cNvGrpSpPr/>
+        <p:nvPr/>
+      </p:nvGrpSpPr>
+      <p:grpSpPr>
+        <a:xfrm>
+          <a:off x="0" y="0"/>
+          <a:ext cx="0" cy="0"/>
+          <a:chOff x="0" y="0"/>
+          <a:chExt cx="0" cy="0"/>
+        </a:xfrm>
+      </p:grpSpPr>
+      <p:sp>
+        <p:nvSpPr>
+          <p:cNvPr id="7" name="Rectangle 6">
+            <a:extLst>
+              <a:ext uri="{FF2B5EF4-FFF2-40B4-BE49-F238E27FC236}">
+                <a16:creationId xmlns:a16="http://schemas.microsoft.com/office/drawing/2014/main" id="{E116E671-ABBE-CE17-9880-383360E1F66C}"/>
+              </a:ext>
+            </a:extLst>
+          </p:cNvPr>
+          <p:cNvSpPr/>
+          <p:nvPr/>
+        </p:nvSpPr>
+        <p:spPr>
+          <a:xfrm>
+            <a:off x="520861" y="1035934"/>
+            <a:ext cx="10897564" cy="995423"/>
+          </a:xfrm>
+          <a:prstGeom prst="rect">
+            <a:avLst/>
+          </a:prstGeom>
+          <a:solidFill>
+            <a:schemeClr val="bg1"/>
+          </a:solidFill>
+          <a:ln>
+            <a:noFill/>
+          </a:ln>
+        </p:spPr>
+        <p:style>
+          <a:lnRef idx="2">
+            <a:schemeClr val="accent1">
+              <a:shade val="15000"/>
+            </a:schemeClr>
+          </a:lnRef>
+          <a:fillRef idx="1">
+            <a:schemeClr val="accent1"/>
+          </a:fillRef>
+          <a:effectRef idx="0">
+            <a:schemeClr val="accent1"/>
+          </a:effectRef>
+          <a:fontRef idx="minor">
+            <a:schemeClr val="lt1"/>
+          </a:fontRef>
+        </p:style>
+        <p:txBody>
+          <a:bodyPr rtlCol="0" anchor="ctr"/>
+          <a:lstStyle/>
+          <a:p>
+            <a:pPr algn="ctr"/>
+            <a:endParaRPr lang="en-US"/>
+          </a:p>
+        </p:txBody>
+      </p:sp>
+      <p:sp>
+        <p:nvSpPr>
+          <p:cNvPr id="6" name="Rectangle 5">
+            <a:extLst>
+              <a:ext uri="{FF2B5EF4-FFF2-40B4-BE49-F238E27FC236}">
+                <a16:creationId xmlns:a16="http://schemas.microsoft.com/office/drawing/2014/main" id="{657C41BA-BA24-2787-F728-278DFD838975}"/>
+              </a:ext>
+            </a:extLst>
+          </p:cNvPr>
+          <p:cNvSpPr/>
+          <p:nvPr/>
+        </p:nvSpPr>
+        <p:spPr>
+          <a:xfrm>
+            <a:off x="4194258" y="6217249"/>
+            <a:ext cx="4540475" cy="769441"/>
+          </a:xfrm>
+          <a:prstGeom prst="rect">
+            <a:avLst/>
+          </a:prstGeom>
+          <a:noFill/>
+        </p:spPr>
+        <p:txBody>
+          <a:bodyPr wrap="none" lIns="91440" tIns="45720" rIns="91440" bIns="45720">
+            <a:spAutoFit/>
+          </a:bodyPr>
+          <a:lstStyle/>
+          <a:p>
+            <a:pPr algn="ctr"/>
+            <a:r>
+              <a:rPr lang="en-US" sz="4400" b="1" cap="none" spc="0" dirty="0">
+                <a:ln w="10160">
+                  <a:solidFill>
+                    <a:schemeClr val="accent5"/>
+                  </a:solidFill>
+                  <a:prstDash val="solid"/>
+                </a:ln>
+                <a:solidFill>
+                  <a:srgbClr val="FFFFFF"/>
+                </a:solidFill>
+                <a:effectLst>
+                  <a:outerShdw blurRad="38100" dist="22860" dir="5400000" algn="tl" rotWithShape="0">
+                    <a:srgbClr val="000000">
+                      <a:alpha val="30000"/>
+                    </a:srgbClr>
+                  </a:outerShdw>
+                </a:effectLst>
+              </a:rPr>
+              <a:t>Sequence Diagram</a:t>
+            </a:r>
+          </a:p>
+        </p:txBody>
+      </p:sp>
+      <p:pic>
+        <p:nvPicPr>
+          <p:cNvPr id="8" name="Picture 7" descr="A diagram of a project&#10;&#10;Description automatically generated">
+            <a:extLst>
+              <a:ext uri="{FF2B5EF4-FFF2-40B4-BE49-F238E27FC236}">
+                <a16:creationId xmlns:a16="http://schemas.microsoft.com/office/drawing/2014/main" id="{EB8E5684-0AE9-B23F-7ED5-C2B337AE6727}"/>
+              </a:ext>
+            </a:extLst>
+          </p:cNvPr>
+          <p:cNvPicPr>
+            <a:picLocks noChangeAspect="1"/>
+          </p:cNvPicPr>
+          <p:nvPr/>
+        </p:nvPicPr>
+        <p:blipFill>
+          <a:blip r:embed="rId2">
+            <a:extLst>
+              <a:ext uri="{28A0092B-C50C-407E-A947-70E740481C1C}">
+                <a14:useLocalDpi xmlns:a14="http://schemas.microsoft.com/office/drawing/2010/main" val="0"/>
+              </a:ext>
+            </a:extLst>
+          </a:blip>
+          <a:stretch>
+            <a:fillRect/>
+          </a:stretch>
+        </p:blipFill>
+        <p:spPr>
+          <a:xfrm>
+            <a:off x="1215283" y="409582"/>
+            <a:ext cx="9761434" cy="5588446"/>
+          </a:xfrm>
+          <a:prstGeom prst="rect">
+            <a:avLst/>
+          </a:prstGeom>
+        </p:spPr>
+      </p:pic>
+    </p:spTree>
+    <p:extLst>
+      <p:ext uri="{BB962C8B-B14F-4D97-AF65-F5344CB8AC3E}">
+        <p14:creationId xmlns:p14="http://schemas.microsoft.com/office/powerpoint/2010/main" val="3100594865"/>
+      </p:ext>
+    </p:extLst>
+  </p:cSld>
+  <p:clrMapOvr>
+    <a:masterClrMapping/>
+  </p:clrMapOvr>
+</p:sld>
+</file>
+
+<file path=ppt/slides/slide12.xml><?xml version="1.0" encoding="utf-8"?>
+<p:sld xmlns:a="http://schemas.openxmlformats.org/drawingml/2006/main" xmlns:r="http://schemas.openxmlformats.org/officeDocument/2006/relationships" xmlns:p="http://schemas.openxmlformats.org/presentationml/2006/main">
+  <p:cSld>
+    <p:spTree>
+      <p:nvGrpSpPr>
+        <p:cNvPr id="1" name=""/>
+        <p:cNvGrpSpPr/>
+        <p:nvPr/>
+      </p:nvGrpSpPr>
+      <p:grpSpPr>
+        <a:xfrm>
+          <a:off x="0" y="0"/>
+          <a:ext cx="0" cy="0"/>
+          <a:chOff x="0" y="0"/>
+          <a:chExt cx="0" cy="0"/>
+        </a:xfrm>
+      </p:grpSpPr>
+      <p:sp>
+        <p:nvSpPr>
+          <p:cNvPr id="2" name="Title 1">
+            <a:extLst>
+              <a:ext uri="{FF2B5EF4-FFF2-40B4-BE49-F238E27FC236}">
+                <a16:creationId xmlns:a16="http://schemas.microsoft.com/office/drawing/2014/main" id="{51989CAB-74F3-7768-C7BB-E3D7DB2D0BE1}"/>
+              </a:ext>
+            </a:extLst>
+          </p:cNvPr>
+          <p:cNvSpPr>
+            <a:spLocks noGrp="1"/>
+          </p:cNvSpPr>
+          <p:nvPr>
+            <p:ph type="title"/>
+          </p:nvPr>
+        </p:nvSpPr>
+        <p:spPr/>
+        <p:txBody>
+          <a:bodyPr/>
+          <a:lstStyle/>
+          <a:p>
+            <a:r>
+              <a:rPr lang="en-VN" dirty="0"/>
+              <a:t>Add Book Dialog</a:t>
+            </a:r>
+          </a:p>
+        </p:txBody>
+      </p:sp>
+      <p:pic>
+        <p:nvPicPr>
+          <p:cNvPr id="5" name="Content Placeholder 4" descr="A computer screen shot of a library application&#10;&#10;Description automatically generated">
+            <a:extLst>
+              <a:ext uri="{FF2B5EF4-FFF2-40B4-BE49-F238E27FC236}">
+                <a16:creationId xmlns:a16="http://schemas.microsoft.com/office/drawing/2014/main" id="{CC347B71-C1C5-C04C-7580-C55C6F4A0F28}"/>
+              </a:ext>
+            </a:extLst>
+          </p:cNvPr>
+          <p:cNvPicPr>
+            <a:picLocks noGrp="1" noChangeAspect="1"/>
+          </p:cNvPicPr>
+          <p:nvPr>
+            <p:ph idx="1"/>
+          </p:nvPr>
+        </p:nvPicPr>
+        <p:blipFill>
+          <a:blip r:embed="rId2">
+            <a:extLst>
+              <a:ext uri="{28A0092B-C50C-407E-A947-70E740481C1C}">
+                <a14:useLocalDpi xmlns:a14="http://schemas.microsoft.com/office/drawing/2010/main" val="0"/>
+              </a:ext>
+            </a:extLst>
+          </a:blip>
+          <a:stretch>
+            <a:fillRect/>
+          </a:stretch>
+        </p:blipFill>
+        <p:spPr>
+          <a:xfrm>
+            <a:off x="2956830" y="1846263"/>
+            <a:ext cx="6338665" cy="4022725"/>
+          </a:xfrm>
+        </p:spPr>
+      </p:pic>
+    </p:spTree>
+    <p:extLst>
+      <p:ext uri="{BB962C8B-B14F-4D97-AF65-F5344CB8AC3E}">
+        <p14:creationId xmlns:p14="http://schemas.microsoft.com/office/powerpoint/2010/main" val="2319996521"/>
+      </p:ext>
+    </p:extLst>
+  </p:cSld>
+  <p:clrMapOvr>
+    <a:masterClrMapping/>
+  </p:clrMapOvr>
+</p:sld>
+</file>
+
+<file path=ppt/slides/slide13.xml><?xml version="1.0" encoding="utf-8"?>
+<p:sld xmlns:a="http://schemas.openxmlformats.org/drawingml/2006/main" xmlns:r="http://schemas.openxmlformats.org/officeDocument/2006/relationships" xmlns:p="http://schemas.openxmlformats.org/presentationml/2006/main">
+  <p:cSld>
+    <p:spTree>
+      <p:nvGrpSpPr>
+        <p:cNvPr id="1" name=""/>
+        <p:cNvGrpSpPr/>
+        <p:nvPr/>
+      </p:nvGrpSpPr>
+      <p:grpSpPr>
+        <a:xfrm>
+          <a:off x="0" y="0"/>
+          <a:ext cx="0" cy="0"/>
+          <a:chOff x="0" y="0"/>
+          <a:chExt cx="0" cy="0"/>
+        </a:xfrm>
+      </p:grpSpPr>
+      <p:sp>
+        <p:nvSpPr>
+          <p:cNvPr id="2" name="Title 1">
+            <a:extLst>
+              <a:ext uri="{FF2B5EF4-FFF2-40B4-BE49-F238E27FC236}">
+                <a16:creationId xmlns:a16="http://schemas.microsoft.com/office/drawing/2014/main" id="{6892F569-65D6-A2F3-AFB7-C985B055A2BC}"/>
+              </a:ext>
+            </a:extLst>
+          </p:cNvPr>
+          <p:cNvSpPr>
+            <a:spLocks noGrp="1"/>
+          </p:cNvSpPr>
+          <p:nvPr>
+            <p:ph type="title"/>
+          </p:nvPr>
+        </p:nvSpPr>
+        <p:spPr/>
+        <p:txBody>
+          <a:bodyPr/>
+          <a:lstStyle/>
+          <a:p>
+            <a:r>
+              <a:rPr lang="en-US" dirty="0" err="1"/>
+              <a:t>Usecase</a:t>
+            </a:r>
+            <a:r>
+              <a:rPr lang="en-US" dirty="0"/>
+              <a:t> Description: Checkout Book </a:t>
+            </a:r>
+          </a:p>
+        </p:txBody>
+      </p:sp>
+      <p:graphicFrame>
+        <p:nvGraphicFramePr>
+          <p:cNvPr id="4" name="Table 7">
+            <a:extLst>
+              <a:ext uri="{FF2B5EF4-FFF2-40B4-BE49-F238E27FC236}">
+                <a16:creationId xmlns:a16="http://schemas.microsoft.com/office/drawing/2014/main" id="{CCF1B50C-EA8F-1133-D409-284A60E342F6}"/>
+              </a:ext>
+            </a:extLst>
+          </p:cNvPr>
+          <p:cNvGraphicFramePr>
+            <a:graphicFrameLocks/>
+          </p:cNvGraphicFramePr>
+          <p:nvPr>
+            <p:extLst>
+              <p:ext uri="{D42A27DB-BD31-4B8C-83A1-F6EECF244321}">
+                <p14:modId xmlns:p14="http://schemas.microsoft.com/office/powerpoint/2010/main" val="3700204033"/>
+              </p:ext>
+            </p:extLst>
+          </p:nvPr>
+        </p:nvGraphicFramePr>
+        <p:xfrm>
+          <a:off x="906780" y="1897056"/>
+          <a:ext cx="10378441" cy="3063888"/>
+        </p:xfrm>
+        <a:graphic>
+          <a:graphicData uri="http://schemas.openxmlformats.org/drawingml/2006/table">
+            <a:tbl>
+              <a:tblPr firstRow="1" bandRow="1">
+                <a:tableStyleId>{5C22544A-7EE6-4342-B048-85BDC9FD1C3A}</a:tableStyleId>
+              </a:tblPr>
+              <a:tblGrid>
+                <a:gridCol w="5045685">
+                  <a:extLst>
+                    <a:ext uri="{9D8B030D-6E8A-4147-A177-3AD203B41FA5}">
+                      <a16:colId xmlns:a16="http://schemas.microsoft.com/office/drawing/2014/main" val="3138249905"/>
+                    </a:ext>
+                  </a:extLst>
+                </a:gridCol>
+                <a:gridCol w="5332756">
+                  <a:extLst>
+                    <a:ext uri="{9D8B030D-6E8A-4147-A177-3AD203B41FA5}">
+                      <a16:colId xmlns:a16="http://schemas.microsoft.com/office/drawing/2014/main" val="2553994940"/>
+                    </a:ext>
+                  </a:extLst>
+                </a:gridCol>
+              </a:tblGrid>
+              <a:tr h="534965">
+                <a:tc>
+                  <a:txBody>
+                    <a:bodyPr/>
+                    <a:lstStyle/>
+                    <a:p>
+                      <a:r>
+                        <a:rPr lang="en-US" sz="2400" dirty="0"/>
+                        <a:t>User Action</a:t>
+                      </a:r>
+                    </a:p>
+                  </a:txBody>
+                  <a:tcPr marL="121583" marR="121583" marT="60791" marB="60791"/>
+                </a:tc>
+                <a:tc>
+                  <a:txBody>
+                    <a:bodyPr/>
+                    <a:lstStyle/>
+                    <a:p>
+                      <a:r>
+                        <a:rPr lang="en-US" sz="2400" dirty="0"/>
+                        <a:t>System Response</a:t>
+                      </a:r>
+                    </a:p>
+                  </a:txBody>
+                  <a:tcPr marL="121583" marR="121583" marT="60791" marB="60791"/>
+                </a:tc>
+                <a:extLst>
+                  <a:ext uri="{0D108BD9-81ED-4DB2-BD59-A6C34878D82A}">
+                    <a16:rowId xmlns:a16="http://schemas.microsoft.com/office/drawing/2014/main" val="3952563860"/>
+                  </a:ext>
+                </a:extLst>
+              </a:tr>
+              <a:tr h="899713">
+                <a:tc>
+                  <a:txBody>
+                    <a:bodyPr/>
+                    <a:lstStyle/>
+                    <a:p>
+                      <a:r>
+                        <a:rPr lang="en-US" sz="2400" dirty="0"/>
+                        <a:t>User select </a:t>
+                      </a:r>
+                      <a:r>
+                        <a:rPr lang="en-US" sz="2400" dirty="0" err="1"/>
+                        <a:t>memberID</a:t>
+                      </a:r>
+                      <a:r>
+                        <a:rPr lang="en-US" sz="2400" dirty="0"/>
+                        <a:t> and ISBN in main view</a:t>
+                      </a:r>
+                    </a:p>
+                  </a:txBody>
+                  <a:tcPr marL="121583" marR="121583" marT="60791" marB="60791"/>
+                </a:tc>
+                <a:tc>
+                  <a:txBody>
+                    <a:bodyPr/>
+                    <a:lstStyle/>
+                    <a:p>
+                      <a:r>
+                        <a:rPr lang="en-US" sz="2400" dirty="0"/>
+                        <a:t>System respond with the list of </a:t>
+                      </a:r>
+                      <a:r>
+                        <a:rPr lang="en-US" sz="2400" dirty="0" err="1"/>
+                        <a:t>memberID</a:t>
+                      </a:r>
+                      <a:r>
+                        <a:rPr lang="en-US" sz="2400" dirty="0"/>
+                        <a:t> and ISBN in screen</a:t>
+                      </a:r>
+                    </a:p>
+                  </a:txBody>
+                  <a:tcPr marL="121583" marR="121583" marT="60791" marB="60791"/>
+                </a:tc>
+                <a:extLst>
+                  <a:ext uri="{0D108BD9-81ED-4DB2-BD59-A6C34878D82A}">
+                    <a16:rowId xmlns:a16="http://schemas.microsoft.com/office/drawing/2014/main" val="1121593986"/>
+                  </a:ext>
+                </a:extLst>
+              </a:tr>
+              <a:tr h="1629210">
+                <a:tc>
+                  <a:txBody>
+                    <a:bodyPr/>
+                    <a:lstStyle/>
+                    <a:p>
+                      <a:r>
+                        <a:rPr lang="en-US" sz="2400" dirty="0"/>
+                        <a:t>User click button “Checkout Book”</a:t>
+                      </a:r>
+                    </a:p>
+                  </a:txBody>
+                  <a:tcPr marL="121583" marR="121583" marT="60791" marB="60791"/>
+                </a:tc>
+                <a:tc>
+                  <a:txBody>
+                    <a:bodyPr/>
+                    <a:lstStyle/>
+                    <a:p>
+                      <a:r>
+                        <a:rPr lang="en-US" sz="2400" dirty="0"/>
+                        <a:t>System validate both member and book copy availability and record the book checkout record and respond with a success message.</a:t>
+                      </a:r>
+                    </a:p>
+                  </a:txBody>
+                  <a:tcPr marL="121583" marR="121583" marT="60791" marB="60791"/>
+                </a:tc>
+                <a:extLst>
+                  <a:ext uri="{0D108BD9-81ED-4DB2-BD59-A6C34878D82A}">
+                    <a16:rowId xmlns:a16="http://schemas.microsoft.com/office/drawing/2014/main" val="2507440164"/>
+                  </a:ext>
+                </a:extLst>
+              </a:tr>
+            </a:tbl>
+          </a:graphicData>
+        </a:graphic>
+      </p:graphicFrame>
+      <p:sp>
+        <p:nvSpPr>
+          <p:cNvPr id="5" name="Rectangle 4">
+            <a:extLst>
+              <a:ext uri="{FF2B5EF4-FFF2-40B4-BE49-F238E27FC236}">
+                <a16:creationId xmlns:a16="http://schemas.microsoft.com/office/drawing/2014/main" id="{4C462DB1-ADC3-7485-E4CE-022B25BCB229}"/>
+              </a:ext>
+            </a:extLst>
+          </p:cNvPr>
+          <p:cNvSpPr/>
+          <p:nvPr/>
+        </p:nvSpPr>
+        <p:spPr>
+          <a:xfrm>
+            <a:off x="4194258" y="6217249"/>
+            <a:ext cx="4540475" cy="769441"/>
+          </a:xfrm>
+          <a:prstGeom prst="rect">
+            <a:avLst/>
+          </a:prstGeom>
+          <a:noFill/>
+        </p:spPr>
+        <p:txBody>
+          <a:bodyPr wrap="none" lIns="91440" tIns="45720" rIns="91440" bIns="45720">
+            <a:spAutoFit/>
+          </a:bodyPr>
+          <a:lstStyle/>
+          <a:p>
+            <a:pPr algn="ctr"/>
+            <a:r>
+              <a:rPr lang="en-US" sz="4400" b="1" cap="none" spc="0" dirty="0">
+                <a:ln w="10160">
+                  <a:solidFill>
+                    <a:schemeClr val="accent5"/>
+                  </a:solidFill>
+                  <a:prstDash val="solid"/>
+                </a:ln>
+                <a:solidFill>
+                  <a:srgbClr val="FFFFFF"/>
+                </a:solidFill>
+                <a:effectLst>
+                  <a:outerShdw blurRad="38100" dist="22860" dir="5400000" algn="tl" rotWithShape="0">
+                    <a:srgbClr val="000000">
+                      <a:alpha val="30000"/>
+                    </a:srgbClr>
+                  </a:outerShdw>
+                </a:effectLst>
+              </a:rPr>
+              <a:t>Sequence Diagram</a:t>
+            </a:r>
+          </a:p>
+        </p:txBody>
+      </p:sp>
+    </p:spTree>
+    <p:extLst>
+      <p:ext uri="{BB962C8B-B14F-4D97-AF65-F5344CB8AC3E}">
+        <p14:creationId xmlns:p14="http://schemas.microsoft.com/office/powerpoint/2010/main" val="2241826948"/>
+      </p:ext>
+    </p:extLst>
+  </p:cSld>
+  <p:clrMapOvr>
+    <a:masterClrMapping/>
+  </p:clrMapOvr>
+</p:sld>
+</file>
+
+<file path=ppt/slides/slide14.xml><?xml version="1.0" encoding="utf-8"?>
+<p:sld xmlns:a="http://schemas.openxmlformats.org/drawingml/2006/main" xmlns:r="http://schemas.openxmlformats.org/officeDocument/2006/relationships" xmlns:p="http://schemas.openxmlformats.org/presentationml/2006/main">
+  <p:cSld>
+    <p:spTree>
+      <p:nvGrpSpPr>
+        <p:cNvPr id="1" name=""/>
+        <p:cNvGrpSpPr/>
+        <p:nvPr/>
+      </p:nvGrpSpPr>
+      <p:grpSpPr>
+        <a:xfrm>
+          <a:off x="0" y="0"/>
+          <a:ext cx="0" cy="0"/>
+          <a:chOff x="0" y="0"/>
+          <a:chExt cx="0" cy="0"/>
+        </a:xfrm>
+      </p:grpSpPr>
+      <p:sp>
+        <p:nvSpPr>
           <p:cNvPr id="7" name="Rectangle 6">
             <a:extLst>
               <a:ext uri="{FF2B5EF4-FFF2-40B4-BE49-F238E27FC236}">
@@ -8967,7 +10012,7 @@
 </p:sld>
 </file>
 
-<file path=ppt/slides/slide11.xml><?xml version="1.0" encoding="utf-8"?>
+<file path=ppt/slides/slide15.xml><?xml version="1.0" encoding="utf-8"?>
 <p:sld xmlns:a="http://schemas.openxmlformats.org/drawingml/2006/main" xmlns:r="http://schemas.openxmlformats.org/officeDocument/2006/relationships" xmlns:p="http://schemas.openxmlformats.org/presentationml/2006/main">
   <p:cSld>
     <p:spTree>
@@ -9036,36 +10081,6 @@
           </a:p>
         </p:txBody>
       </p:sp>
-      <p:pic>
-        <p:nvPicPr>
-          <p:cNvPr id="5" name="Picture 4">
-            <a:extLst>
-              <a:ext uri="{FF2B5EF4-FFF2-40B4-BE49-F238E27FC236}">
-                <a16:creationId xmlns:a16="http://schemas.microsoft.com/office/drawing/2014/main" id="{4ACB05CE-BF10-4D78-EB9B-3FDEEEDDF7CE}"/>
-              </a:ext>
-            </a:extLst>
-          </p:cNvPr>
-          <p:cNvPicPr>
-            <a:picLocks noChangeAspect="1"/>
-          </p:cNvPicPr>
-          <p:nvPr/>
-        </p:nvPicPr>
-        <p:blipFill>
-          <a:blip r:embed="rId2"/>
-          <a:stretch>
-            <a:fillRect/>
-          </a:stretch>
-        </p:blipFill>
-        <p:spPr>
-          <a:xfrm>
-            <a:off x="1448280" y="281441"/>
-            <a:ext cx="9295440" cy="5935808"/>
-          </a:xfrm>
-          <a:prstGeom prst="rect">
-            <a:avLst/>
-          </a:prstGeom>
-        </p:spPr>
-      </p:pic>
       <p:sp>
         <p:nvSpPr>
           <p:cNvPr id="6" name="Rectangle 5">
@@ -9119,6 +10134,42 @@
           </a:p>
         </p:txBody>
       </p:sp>
+      <p:pic>
+        <p:nvPicPr>
+          <p:cNvPr id="3" name="Picture 2" descr="A screenshot of a computer&#10;&#10;Description automatically generated">
+            <a:extLst>
+              <a:ext uri="{FF2B5EF4-FFF2-40B4-BE49-F238E27FC236}">
+                <a16:creationId xmlns:a16="http://schemas.microsoft.com/office/drawing/2014/main" id="{B37FA383-2890-AF89-33E4-1F47360161EF}"/>
+              </a:ext>
+            </a:extLst>
+          </p:cNvPr>
+          <p:cNvPicPr>
+            <a:picLocks noChangeAspect="1"/>
+          </p:cNvPicPr>
+          <p:nvPr/>
+        </p:nvPicPr>
+        <p:blipFill>
+          <a:blip r:embed="rId2">
+            <a:extLst>
+              <a:ext uri="{28A0092B-C50C-407E-A947-70E740481C1C}">
+                <a14:useLocalDpi xmlns:a14="http://schemas.microsoft.com/office/drawing/2010/main" val="0"/>
+              </a:ext>
+            </a:extLst>
+          </a:blip>
+          <a:stretch>
+            <a:fillRect/>
+          </a:stretch>
+        </p:blipFill>
+        <p:spPr>
+          <a:xfrm>
+            <a:off x="2209800" y="707571"/>
+            <a:ext cx="7772400" cy="4946713"/>
+          </a:xfrm>
+          <a:prstGeom prst="rect">
+            <a:avLst/>
+          </a:prstGeom>
+        </p:spPr>
+      </p:pic>
     </p:spTree>
     <p:extLst>
       <p:ext uri="{BB962C8B-B14F-4D97-AF65-F5344CB8AC3E}">
@@ -9132,7 +10183,7 @@
 </p:sld>
 </file>
 
-<file path=ppt/slides/slide12.xml><?xml version="1.0" encoding="utf-8"?>
+<file path=ppt/slides/slide16.xml><?xml version="1.0" encoding="utf-8"?>
 <p:sld xmlns:a="http://schemas.openxmlformats.org/drawingml/2006/main" xmlns:r="http://schemas.openxmlformats.org/officeDocument/2006/relationships" xmlns:p="http://schemas.openxmlformats.org/presentationml/2006/main">
   <p:cSld>
     <p:spTree>
@@ -9465,7 +10516,7 @@
 </p:sld>
 </file>
 
-<file path=ppt/slides/slide13.xml><?xml version="1.0" encoding="utf-8"?>
+<file path=ppt/slides/slide17.xml><?xml version="1.0" encoding="utf-8"?>
 <p:sld xmlns:a="http://schemas.openxmlformats.org/drawingml/2006/main" xmlns:r="http://schemas.openxmlformats.org/officeDocument/2006/relationships" xmlns:p="http://schemas.openxmlformats.org/presentationml/2006/main">
   <p:cSld>
     <p:spTree>
@@ -9634,7 +10685,7 @@
 </p:sld>
 </file>
 
-<file path=ppt/slides/slide14.xml><?xml version="1.0" encoding="utf-8"?>
+<file path=ppt/slides/slide18.xml><?xml version="1.0" encoding="utf-8"?>
 <p:sld xmlns:a="http://schemas.openxmlformats.org/drawingml/2006/main" xmlns:r="http://schemas.openxmlformats.org/officeDocument/2006/relationships" xmlns:p="http://schemas.openxmlformats.org/presentationml/2006/main">
   <p:cSld>
     <p:spTree>
@@ -9703,36 +10754,6 @@
           </a:p>
         </p:txBody>
       </p:sp>
-      <p:pic>
-        <p:nvPicPr>
-          <p:cNvPr id="9" name="Picture 8">
-            <a:extLst>
-              <a:ext uri="{FF2B5EF4-FFF2-40B4-BE49-F238E27FC236}">
-                <a16:creationId xmlns:a16="http://schemas.microsoft.com/office/drawing/2014/main" id="{03A73BB9-0AE6-F005-C188-92B6F06A1431}"/>
-              </a:ext>
-            </a:extLst>
-          </p:cNvPr>
-          <p:cNvPicPr>
-            <a:picLocks noChangeAspect="1"/>
-          </p:cNvPicPr>
-          <p:nvPr/>
-        </p:nvPicPr>
-        <p:blipFill>
-          <a:blip r:embed="rId2"/>
-          <a:stretch>
-            <a:fillRect/>
-          </a:stretch>
-        </p:blipFill>
-        <p:spPr>
-          <a:xfrm>
-            <a:off x="1762081" y="582787"/>
-            <a:ext cx="8667838" cy="5534693"/>
-          </a:xfrm>
-          <a:prstGeom prst="rect">
-            <a:avLst/>
-          </a:prstGeom>
-        </p:spPr>
-      </p:pic>
       <p:sp>
         <p:nvSpPr>
           <p:cNvPr id="10" name="Rectangle 9">
@@ -9786,6 +10807,42 @@
           </a:p>
         </p:txBody>
       </p:sp>
+      <p:pic>
+        <p:nvPicPr>
+          <p:cNvPr id="3" name="Picture 2" descr="A screenshot of a computer&#10;&#10;Description automatically generated">
+            <a:extLst>
+              <a:ext uri="{FF2B5EF4-FFF2-40B4-BE49-F238E27FC236}">
+                <a16:creationId xmlns:a16="http://schemas.microsoft.com/office/drawing/2014/main" id="{3859B5E6-3130-E9A1-C22F-3F01C3436B09}"/>
+              </a:ext>
+            </a:extLst>
+          </p:cNvPr>
+          <p:cNvPicPr>
+            <a:picLocks noChangeAspect="1"/>
+          </p:cNvPicPr>
+          <p:nvPr/>
+        </p:nvPicPr>
+        <p:blipFill>
+          <a:blip r:embed="rId2">
+            <a:extLst>
+              <a:ext uri="{28A0092B-C50C-407E-A947-70E740481C1C}">
+                <a14:useLocalDpi xmlns:a14="http://schemas.microsoft.com/office/drawing/2010/main" val="0"/>
+              </a:ext>
+            </a:extLst>
+          </a:blip>
+          <a:stretch>
+            <a:fillRect/>
+          </a:stretch>
+        </p:blipFill>
+        <p:spPr>
+          <a:xfrm>
+            <a:off x="2083443" y="653143"/>
+            <a:ext cx="7772400" cy="4937096"/>
+          </a:xfrm>
+          <a:prstGeom prst="rect">
+            <a:avLst/>
+          </a:prstGeom>
+        </p:spPr>
+      </p:pic>
     </p:spTree>
     <p:extLst>
       <p:ext uri="{BB962C8B-B14F-4D97-AF65-F5344CB8AC3E}">
@@ -9799,7 +10856,7 @@
 </p:sld>
 </file>
 
-<file path=ppt/slides/slide15.xml><?xml version="1.0" encoding="utf-8"?>
+<file path=ppt/slides/slide19.xml><?xml version="1.0" encoding="utf-8"?>
 <p:sld xmlns:a="http://schemas.openxmlformats.org/drawingml/2006/main" xmlns:r="http://schemas.openxmlformats.org/officeDocument/2006/relationships" xmlns:p="http://schemas.openxmlformats.org/presentationml/2006/main">
   <p:cSld>
     <p:spTree>
@@ -9935,7 +10992,112 @@
 </p:sld>
 </file>
 
-<file path=ppt/slides/slide16.xml><?xml version="1.0" encoding="utf-8"?>
+<file path=ppt/slides/slide2.xml><?xml version="1.0" encoding="utf-8"?>
+<p:sld xmlns:a="http://schemas.openxmlformats.org/drawingml/2006/main" xmlns:r="http://schemas.openxmlformats.org/officeDocument/2006/relationships" xmlns:p="http://schemas.openxmlformats.org/presentationml/2006/main">
+  <p:cSld>
+    <p:bg>
+      <p:bgPr>
+        <a:solidFill>
+          <a:schemeClr val="bg1"/>
+        </a:solidFill>
+        <a:effectLst/>
+      </p:bgPr>
+    </p:bg>
+    <p:spTree>
+      <p:nvGrpSpPr>
+        <p:cNvPr id="1" name=""/>
+        <p:cNvGrpSpPr/>
+        <p:nvPr/>
+      </p:nvGrpSpPr>
+      <p:grpSpPr>
+        <a:xfrm>
+          <a:off x="0" y="0"/>
+          <a:ext cx="0" cy="0"/>
+          <a:chOff x="0" y="0"/>
+          <a:chExt cx="0" cy="0"/>
+        </a:xfrm>
+      </p:grpSpPr>
+      <p:sp>
+        <p:nvSpPr>
+          <p:cNvPr id="2" name="Title 1">
+            <a:extLst>
+              <a:ext uri="{FF2B5EF4-FFF2-40B4-BE49-F238E27FC236}">
+                <a16:creationId xmlns:a16="http://schemas.microsoft.com/office/drawing/2014/main" id="{F0C5FA17-991A-7768-EE29-12F199F6D6DB}"/>
+              </a:ext>
+            </a:extLst>
+          </p:cNvPr>
+          <p:cNvSpPr>
+            <a:spLocks noGrp="1"/>
+          </p:cNvSpPr>
+          <p:nvPr>
+            <p:ph type="title"/>
+          </p:nvPr>
+        </p:nvSpPr>
+        <p:spPr>
+          <a:xfrm>
+            <a:off x="1097280" y="286603"/>
+            <a:ext cx="10058400" cy="1450757"/>
+          </a:xfrm>
+        </p:spPr>
+        <p:txBody>
+          <a:bodyPr>
+            <a:normAutofit/>
+          </a:bodyPr>
+          <a:lstStyle/>
+          <a:p>
+            <a:r>
+              <a:rPr lang="en-US" dirty="0" err="1"/>
+              <a:t>Mainpoint</a:t>
+            </a:r>
+            <a:endParaRPr lang="en-US"/>
+          </a:p>
+        </p:txBody>
+      </p:sp>
+      <p:graphicFrame>
+        <p:nvGraphicFramePr>
+          <p:cNvPr id="5" name="Content Placeholder 2">
+            <a:extLst>
+              <a:ext uri="{FF2B5EF4-FFF2-40B4-BE49-F238E27FC236}">
+                <a16:creationId xmlns:a16="http://schemas.microsoft.com/office/drawing/2014/main" id="{EE45747A-A6D7-A5E2-C26B-C86C8F800792}"/>
+              </a:ext>
+            </a:extLst>
+          </p:cNvPr>
+          <p:cNvGraphicFramePr>
+            <a:graphicFrameLocks noGrp="1"/>
+          </p:cNvGraphicFramePr>
+          <p:nvPr>
+            <p:ph idx="1"/>
+            <p:extLst>
+              <p:ext uri="{D42A27DB-BD31-4B8C-83A1-F6EECF244321}">
+                <p14:modId xmlns:p14="http://schemas.microsoft.com/office/powerpoint/2010/main" val="3472816609"/>
+              </p:ext>
+            </p:extLst>
+          </p:nvPr>
+        </p:nvGraphicFramePr>
+        <p:xfrm>
+          <a:off x="1096963" y="2098515"/>
+          <a:ext cx="10058400" cy="3786080"/>
+        </p:xfrm>
+        <a:graphic>
+          <a:graphicData uri="http://schemas.openxmlformats.org/drawingml/2006/diagram">
+            <dgm:relIds xmlns:dgm="http://schemas.openxmlformats.org/drawingml/2006/diagram" xmlns:r="http://schemas.openxmlformats.org/officeDocument/2006/relationships" r:dm="rId2" r:lo="rId3" r:qs="rId4" r:cs="rId5"/>
+          </a:graphicData>
+        </a:graphic>
+      </p:graphicFrame>
+    </p:spTree>
+    <p:extLst>
+      <p:ext uri="{BB962C8B-B14F-4D97-AF65-F5344CB8AC3E}">
+        <p14:creationId xmlns:p14="http://schemas.microsoft.com/office/powerpoint/2010/main" val="988461907"/>
+      </p:ext>
+    </p:extLst>
+  </p:cSld>
+  <p:clrMapOvr>
+    <a:masterClrMapping/>
+  </p:clrMapOvr>
+</p:sld>
+</file>
+
+<file path=ppt/slides/slide20.xml><?xml version="1.0" encoding="utf-8"?>
 <p:sld xmlns:a="http://schemas.openxmlformats.org/drawingml/2006/main" xmlns:r="http://schemas.openxmlformats.org/officeDocument/2006/relationships" xmlns:p="http://schemas.openxmlformats.org/presentationml/2006/main">
   <p:cSld>
     <p:bg>
@@ -10472,17 +11634,9 @@
 </p:sld>
 </file>
 
-<file path=ppt/slides/slide2.xml><?xml version="1.0" encoding="utf-8"?>
+<file path=ppt/slides/slide3.xml><?xml version="1.0" encoding="utf-8"?>
 <p:sld xmlns:a="http://schemas.openxmlformats.org/drawingml/2006/main" xmlns:r="http://schemas.openxmlformats.org/officeDocument/2006/relationships" xmlns:p="http://schemas.openxmlformats.org/presentationml/2006/main">
   <p:cSld>
-    <p:bg>
-      <p:bgPr>
-        <a:solidFill>
-          <a:schemeClr val="bg1"/>
-        </a:solidFill>
-        <a:effectLst/>
-      </p:bgPr>
-    </p:bg>
     <p:spTree>
       <p:nvGrpSpPr>
         <p:cNvPr id="1" name=""/>
@@ -10502,7 +11656,7 @@
           <p:cNvPr id="2" name="Title 1">
             <a:extLst>
               <a:ext uri="{FF2B5EF4-FFF2-40B4-BE49-F238E27FC236}">
-                <a16:creationId xmlns:a16="http://schemas.microsoft.com/office/drawing/2014/main" id="{F0C5FA17-991A-7768-EE29-12F199F6D6DB}"/>
+                <a16:creationId xmlns:a16="http://schemas.microsoft.com/office/drawing/2014/main" id="{AF759D43-50E3-3D83-8AD9-67ABA32D934F}"/>
               </a:ext>
             </a:extLst>
           </p:cNvPr>
@@ -10513,61 +11667,112 @@
             <p:ph type="title"/>
           </p:nvPr>
         </p:nvSpPr>
-        <p:spPr>
-          <a:xfrm>
-            <a:off x="1097280" y="286603"/>
-            <a:ext cx="10058400" cy="1450757"/>
-          </a:xfrm>
-        </p:spPr>
+        <p:spPr/>
         <p:txBody>
-          <a:bodyPr>
-            <a:normAutofit/>
-          </a:bodyPr>
+          <a:bodyPr/>
           <a:lstStyle/>
           <a:p>
             <a:r>
-              <a:rPr lang="en-US" dirty="0" err="1"/>
-              <a:t>Mainpoint</a:t>
+              <a:rPr lang="en-VN" dirty="0"/>
+              <a:t>Application Architecture</a:t>
             </a:r>
-            <a:endParaRPr lang="en-US"/>
           </a:p>
         </p:txBody>
       </p:sp>
-      <p:graphicFrame>
-        <p:nvGraphicFramePr>
-          <p:cNvPr id="5" name="Content Placeholder 2">
+      <p:pic>
+        <p:nvPicPr>
+          <p:cNvPr id="13" name="Content Placeholder 12" descr="A diagram of a company&#10;&#10;Description automatically generated">
             <a:extLst>
               <a:ext uri="{FF2B5EF4-FFF2-40B4-BE49-F238E27FC236}">
-                <a16:creationId xmlns:a16="http://schemas.microsoft.com/office/drawing/2014/main" id="{EE45747A-A6D7-A5E2-C26B-C86C8F800792}"/>
+                <a16:creationId xmlns:a16="http://schemas.microsoft.com/office/drawing/2014/main" id="{C7B2EFE3-48D1-8C74-8D4A-165036B9CBD6}"/>
               </a:ext>
             </a:extLst>
           </p:cNvPr>
-          <p:cNvGraphicFramePr>
-            <a:graphicFrameLocks noGrp="1"/>
-          </p:cNvGraphicFramePr>
+          <p:cNvPicPr>
+            <a:picLocks noGrp="1" noChangeAspect="1"/>
+          </p:cNvPicPr>
           <p:nvPr>
             <p:ph idx="1"/>
-            <p:extLst>
-              <p:ext uri="{D42A27DB-BD31-4B8C-83A1-F6EECF244321}">
-                <p14:modId xmlns:p14="http://schemas.microsoft.com/office/powerpoint/2010/main" val="353135163"/>
-              </p:ext>
-            </p:extLst>
           </p:nvPr>
-        </p:nvGraphicFramePr>
-        <p:xfrm>
-          <a:off x="1096963" y="2098515"/>
-          <a:ext cx="10058400" cy="3786080"/>
-        </p:xfrm>
-        <a:graphic>
-          <a:graphicData uri="http://schemas.openxmlformats.org/drawingml/2006/diagram">
-            <dgm:relIds xmlns:dgm="http://schemas.openxmlformats.org/drawingml/2006/diagram" xmlns:r="http://schemas.openxmlformats.org/officeDocument/2006/relationships" r:dm="rId2" r:lo="rId3" r:qs="rId4" r:cs="rId5"/>
-          </a:graphicData>
-        </a:graphic>
-      </p:graphicFrame>
+        </p:nvPicPr>
+        <p:blipFill>
+          <a:blip r:embed="rId2">
+            <a:extLst>
+              <a:ext uri="{28A0092B-C50C-407E-A947-70E740481C1C}">
+                <a14:useLocalDpi xmlns:a14="http://schemas.microsoft.com/office/drawing/2010/main" val="0"/>
+              </a:ext>
+            </a:extLst>
+          </a:blip>
+          <a:stretch>
+            <a:fillRect/>
+          </a:stretch>
+        </p:blipFill>
+        <p:spPr>
+          <a:xfrm>
+            <a:off x="1097279" y="2030413"/>
+            <a:ext cx="8325167" cy="3929992"/>
+          </a:xfrm>
+        </p:spPr>
+      </p:pic>
+      <p:sp>
+        <p:nvSpPr>
+          <p:cNvPr id="15" name="Rounded Rectangle 14">
+            <a:extLst>
+              <a:ext uri="{FF2B5EF4-FFF2-40B4-BE49-F238E27FC236}">
+                <a16:creationId xmlns:a16="http://schemas.microsoft.com/office/drawing/2014/main" id="{439CBF18-8FF3-1639-CC9A-F62791EE38B8}"/>
+              </a:ext>
+            </a:extLst>
+          </p:cNvPr>
+          <p:cNvSpPr/>
+          <p:nvPr/>
+        </p:nvSpPr>
+        <p:spPr>
+          <a:xfrm>
+            <a:off x="1493406" y="2030413"/>
+            <a:ext cx="3679371" cy="451530"/>
+          </a:xfrm>
+          <a:prstGeom prst="roundRect">
+            <a:avLst/>
+          </a:prstGeom>
+          <a:solidFill>
+            <a:schemeClr val="accent2"/>
+          </a:solidFill>
+          <a:ln>
+            <a:noFill/>
+          </a:ln>
+        </p:spPr>
+        <p:style>
+          <a:lnRef idx="2">
+            <a:schemeClr val="accent1">
+              <a:shade val="15000"/>
+            </a:schemeClr>
+          </a:lnRef>
+          <a:fillRef idx="1">
+            <a:schemeClr val="accent1"/>
+          </a:fillRef>
+          <a:effectRef idx="0">
+            <a:schemeClr val="accent1"/>
+          </a:effectRef>
+          <a:fontRef idx="minor">
+            <a:schemeClr val="lt1"/>
+          </a:fontRef>
+        </p:style>
+        <p:txBody>
+          <a:bodyPr rtlCol="0" anchor="ctr"/>
+          <a:lstStyle/>
+          <a:p>
+            <a:pPr algn="ctr"/>
+            <a:r>
+              <a:rPr lang="en-VN" dirty="0"/>
+              <a:t>State Management</a:t>
+            </a:r>
+          </a:p>
+        </p:txBody>
+      </p:sp>
     </p:spTree>
     <p:extLst>
       <p:ext uri="{BB962C8B-B14F-4D97-AF65-F5344CB8AC3E}">
-        <p14:creationId xmlns:p14="http://schemas.microsoft.com/office/powerpoint/2010/main" val="988461907"/>
+        <p14:creationId xmlns:p14="http://schemas.microsoft.com/office/powerpoint/2010/main" val="3022731511"/>
       </p:ext>
     </p:extLst>
   </p:cSld>
@@ -10577,7 +11782,7 @@
 </p:sld>
 </file>
 
-<file path=ppt/slides/slide3.xml><?xml version="1.0" encoding="utf-8"?>
+<file path=ppt/slides/slide4.xml><?xml version="1.0" encoding="utf-8"?>
 <p:sld xmlns:a="http://schemas.openxmlformats.org/drawingml/2006/main" xmlns:r="http://schemas.openxmlformats.org/officeDocument/2006/relationships" xmlns:p="http://schemas.openxmlformats.org/presentationml/2006/main">
   <p:cSld>
     <p:spTree>
@@ -10762,7 +11967,7 @@
 </p:sld>
 </file>
 
-<file path=ppt/slides/slide4.xml><?xml version="1.0" encoding="utf-8"?>
+<file path=ppt/slides/slide5.xml><?xml version="1.0" encoding="utf-8"?>
 <p:sld xmlns:a="http://schemas.openxmlformats.org/drawingml/2006/main" xmlns:r="http://schemas.openxmlformats.org/officeDocument/2006/relationships" xmlns:p="http://schemas.openxmlformats.org/presentationml/2006/main">
   <p:cSld>
     <p:spTree>
@@ -10927,7 +12132,7 @@
 </p:sld>
 </file>
 
-<file path=ppt/slides/slide5.xml><?xml version="1.0" encoding="utf-8"?>
+<file path=ppt/slides/slide6.xml><?xml version="1.0" encoding="utf-8"?>
 <p:sld xmlns:a="http://schemas.openxmlformats.org/drawingml/2006/main" xmlns:r="http://schemas.openxmlformats.org/officeDocument/2006/relationships" xmlns:p="http://schemas.openxmlformats.org/presentationml/2006/main">
   <p:cSld>
     <p:spTree>
@@ -11091,7 +12296,7 @@
 </p:sld>
 </file>
 
-<file path=ppt/slides/slide6.xml><?xml version="1.0" encoding="utf-8"?>
+<file path=ppt/slides/slide7.xml><?xml version="1.0" encoding="utf-8"?>
 <p:sld xmlns:a="http://schemas.openxmlformats.org/drawingml/2006/main" xmlns:r="http://schemas.openxmlformats.org/officeDocument/2006/relationships" xmlns:p="http://schemas.openxmlformats.org/presentationml/2006/main">
   <p:cSld>
     <p:spTree>
@@ -11402,7 +12607,7 @@
 </p:sld>
 </file>
 
-<file path=ppt/slides/slide7.xml><?xml version="1.0" encoding="utf-8"?>
+<file path=ppt/slides/slide8.xml><?xml version="1.0" encoding="utf-8"?>
 <p:sld xmlns:a="http://schemas.openxmlformats.org/drawingml/2006/main" xmlns:r="http://schemas.openxmlformats.org/officeDocument/2006/relationships" xmlns:p="http://schemas.openxmlformats.org/presentationml/2006/main">
   <p:cSld>
     <p:spTree>
@@ -11573,171 +12778,6 @@
 </p:sld>
 </file>
 
-<file path=ppt/slides/slide8.xml><?xml version="1.0" encoding="utf-8"?>
-<p:sld xmlns:a="http://schemas.openxmlformats.org/drawingml/2006/main" xmlns:r="http://schemas.openxmlformats.org/officeDocument/2006/relationships" xmlns:p="http://schemas.openxmlformats.org/presentationml/2006/main">
-  <p:cSld>
-    <p:spTree>
-      <p:nvGrpSpPr>
-        <p:cNvPr id="1" name=""/>
-        <p:cNvGrpSpPr/>
-        <p:nvPr/>
-      </p:nvGrpSpPr>
-      <p:grpSpPr>
-        <a:xfrm>
-          <a:off x="0" y="0"/>
-          <a:ext cx="0" cy="0"/>
-          <a:chOff x="0" y="0"/>
-          <a:chExt cx="0" cy="0"/>
-        </a:xfrm>
-      </p:grpSpPr>
-      <p:sp>
-        <p:nvSpPr>
-          <p:cNvPr id="7" name="Rectangle 6">
-            <a:extLst>
-              <a:ext uri="{FF2B5EF4-FFF2-40B4-BE49-F238E27FC236}">
-                <a16:creationId xmlns:a16="http://schemas.microsoft.com/office/drawing/2014/main" id="{1AE17190-D7B4-7286-329D-9AE80AA09D48}"/>
-              </a:ext>
-            </a:extLst>
-          </p:cNvPr>
-          <p:cNvSpPr/>
-          <p:nvPr/>
-        </p:nvSpPr>
-        <p:spPr>
-          <a:xfrm>
-            <a:off x="520861" y="1035934"/>
-            <a:ext cx="10897564" cy="995423"/>
-          </a:xfrm>
-          <a:prstGeom prst="rect">
-            <a:avLst/>
-          </a:prstGeom>
-          <a:solidFill>
-            <a:schemeClr val="bg1"/>
-          </a:solidFill>
-          <a:ln>
-            <a:noFill/>
-          </a:ln>
-        </p:spPr>
-        <p:style>
-          <a:lnRef idx="2">
-            <a:schemeClr val="accent1">
-              <a:shade val="15000"/>
-            </a:schemeClr>
-          </a:lnRef>
-          <a:fillRef idx="1">
-            <a:schemeClr val="accent1"/>
-          </a:fillRef>
-          <a:effectRef idx="0">
-            <a:schemeClr val="accent1"/>
-          </a:effectRef>
-          <a:fontRef idx="minor">
-            <a:schemeClr val="lt1"/>
-          </a:fontRef>
-        </p:style>
-        <p:txBody>
-          <a:bodyPr rtlCol="0" anchor="ctr"/>
-          <a:lstStyle/>
-          <a:p>
-            <a:pPr algn="ctr"/>
-            <a:endParaRPr lang="en-US"/>
-          </a:p>
-        </p:txBody>
-      </p:sp>
-      <p:pic>
-        <p:nvPicPr>
-          <p:cNvPr id="5" name="Picture 4">
-            <a:extLst>
-              <a:ext uri="{FF2B5EF4-FFF2-40B4-BE49-F238E27FC236}">
-                <a16:creationId xmlns:a16="http://schemas.microsoft.com/office/drawing/2014/main" id="{AEE92A63-DC8A-88D5-8D4B-3BEB08518AB1}"/>
-              </a:ext>
-            </a:extLst>
-          </p:cNvPr>
-          <p:cNvPicPr>
-            <a:picLocks noChangeAspect="1"/>
-          </p:cNvPicPr>
-          <p:nvPr/>
-        </p:nvPicPr>
-        <p:blipFill>
-          <a:blip r:embed="rId2"/>
-          <a:stretch>
-            <a:fillRect/>
-          </a:stretch>
-        </p:blipFill>
-        <p:spPr>
-          <a:xfrm>
-            <a:off x="2816711" y="1421547"/>
-            <a:ext cx="6558578" cy="4014906"/>
-          </a:xfrm>
-          <a:prstGeom prst="rect">
-            <a:avLst/>
-          </a:prstGeom>
-        </p:spPr>
-      </p:pic>
-      <p:sp>
-        <p:nvSpPr>
-          <p:cNvPr id="6" name="Rectangle 5">
-            <a:extLst>
-              <a:ext uri="{FF2B5EF4-FFF2-40B4-BE49-F238E27FC236}">
-                <a16:creationId xmlns:a16="http://schemas.microsoft.com/office/drawing/2014/main" id="{7FB9C3A3-CFB5-4AA6-B2E3-22F421241E20}"/>
-              </a:ext>
-            </a:extLst>
-          </p:cNvPr>
-          <p:cNvSpPr/>
-          <p:nvPr/>
-        </p:nvSpPr>
-        <p:spPr>
-          <a:xfrm>
-            <a:off x="4194258" y="6217249"/>
-            <a:ext cx="4540475" cy="769441"/>
-          </a:xfrm>
-          <a:prstGeom prst="rect">
-            <a:avLst/>
-          </a:prstGeom>
-          <a:noFill/>
-        </p:spPr>
-        <p:txBody>
-          <a:bodyPr wrap="none" lIns="91440" tIns="45720" rIns="91440" bIns="45720">
-            <a:spAutoFit/>
-          </a:bodyPr>
-          <a:lstStyle/>
-          <a:p>
-            <a:pPr algn="ctr"/>
-            <a:r>
-              <a:rPr lang="en-US" sz="4400" b="1" cap="none" spc="0" dirty="0">
-                <a:ln w="10160">
-                  <a:solidFill>
-                    <a:schemeClr val="accent5"/>
-                  </a:solidFill>
-                  <a:prstDash val="solid"/>
-                </a:ln>
-                <a:solidFill>
-                  <a:srgbClr val="FFFFFF"/>
-                </a:solidFill>
-                <a:effectLst>
-                  <a:outerShdw blurRad="38100" dist="22860" dir="5400000" algn="tl" rotWithShape="0">
-                    <a:srgbClr val="000000">
-                      <a:alpha val="30000"/>
-                    </a:srgbClr>
-                  </a:outerShdw>
-                </a:effectLst>
-              </a:rPr>
-              <a:t>Sequence Diagram</a:t>
-            </a:r>
-          </a:p>
-        </p:txBody>
-      </p:sp>
-    </p:spTree>
-    <p:extLst>
-      <p:ext uri="{BB962C8B-B14F-4D97-AF65-F5344CB8AC3E}">
-        <p14:creationId xmlns:p14="http://schemas.microsoft.com/office/powerpoint/2010/main" val="1186088647"/>
-      </p:ext>
-    </p:extLst>
-  </p:cSld>
-  <p:clrMapOvr>
-    <a:masterClrMapping/>
-  </p:clrMapOvr>
-</p:sld>
-</file>
-
 <file path=ppt/slides/slide9.xml><?xml version="1.0" encoding="utf-8"?>
 <p:sld xmlns:a="http://schemas.openxmlformats.org/drawingml/2006/main" xmlns:r="http://schemas.openxmlformats.org/officeDocument/2006/relationships" xmlns:p="http://schemas.openxmlformats.org/presentationml/2006/main">
   <p:cSld>
@@ -11760,7 +12800,7 @@
           <p:cNvPr id="2" name="Title 1">
             <a:extLst>
               <a:ext uri="{FF2B5EF4-FFF2-40B4-BE49-F238E27FC236}">
-                <a16:creationId xmlns:a16="http://schemas.microsoft.com/office/drawing/2014/main" id="{6892F569-65D6-A2F3-AFB7-C985B055A2BC}"/>
+                <a16:creationId xmlns:a16="http://schemas.microsoft.com/office/drawing/2014/main" id="{6FF2CB96-D54E-6C17-FD97-2B1813931AA7}"/>
               </a:ext>
             </a:extLst>
           </p:cNvPr>
@@ -11777,238 +12817,51 @@
           <a:lstStyle/>
           <a:p>
             <a:r>
-              <a:rPr lang="en-US" dirty="0" err="1"/>
-              <a:t>Usecase</a:t>
-            </a:r>
-            <a:r>
-              <a:rPr lang="en-US" dirty="0"/>
-              <a:t> Description: Checkout Book </a:t>
+              <a:rPr lang="en-VN" dirty="0"/>
+              <a:t>Login Window</a:t>
             </a:r>
           </a:p>
         </p:txBody>
       </p:sp>
-      <p:graphicFrame>
-        <p:nvGraphicFramePr>
-          <p:cNvPr id="4" name="Table 7">
+      <p:pic>
+        <p:nvPicPr>
+          <p:cNvPr id="6" name="Content Placeholder 5" descr="A screenshot of a computer login&#10;&#10;Description automatically generated">
             <a:extLst>
               <a:ext uri="{FF2B5EF4-FFF2-40B4-BE49-F238E27FC236}">
-                <a16:creationId xmlns:a16="http://schemas.microsoft.com/office/drawing/2014/main" id="{CCF1B50C-EA8F-1133-D409-284A60E342F6}"/>
+                <a16:creationId xmlns:a16="http://schemas.microsoft.com/office/drawing/2014/main" id="{D2836190-EF11-4F43-9C89-1CF234409242}"/>
               </a:ext>
             </a:extLst>
           </p:cNvPr>
-          <p:cNvGraphicFramePr>
-            <a:graphicFrameLocks/>
-          </p:cNvGraphicFramePr>
+          <p:cNvPicPr>
+            <a:picLocks noGrp="1" noChangeAspect="1"/>
+          </p:cNvPicPr>
           <p:nvPr>
-            <p:extLst>
-              <p:ext uri="{D42A27DB-BD31-4B8C-83A1-F6EECF244321}">
-                <p14:modId xmlns:p14="http://schemas.microsoft.com/office/powerpoint/2010/main" val="3700204033"/>
-              </p:ext>
-            </p:extLst>
+            <p:ph idx="1"/>
           </p:nvPr>
-        </p:nvGraphicFramePr>
-        <p:xfrm>
-          <a:off x="906780" y="1897056"/>
-          <a:ext cx="10378441" cy="3063888"/>
-        </p:xfrm>
-        <a:graphic>
-          <a:graphicData uri="http://schemas.openxmlformats.org/drawingml/2006/table">
-            <a:tbl>
-              <a:tblPr firstRow="1" bandRow="1">
-                <a:tableStyleId>{5C22544A-7EE6-4342-B048-85BDC9FD1C3A}</a:tableStyleId>
-              </a:tblPr>
-              <a:tblGrid>
-                <a:gridCol w="5045685">
-                  <a:extLst>
-                    <a:ext uri="{9D8B030D-6E8A-4147-A177-3AD203B41FA5}">
-                      <a16:colId xmlns:a16="http://schemas.microsoft.com/office/drawing/2014/main" val="3138249905"/>
-                    </a:ext>
-                  </a:extLst>
-                </a:gridCol>
-                <a:gridCol w="5332756">
-                  <a:extLst>
-                    <a:ext uri="{9D8B030D-6E8A-4147-A177-3AD203B41FA5}">
-                      <a16:colId xmlns:a16="http://schemas.microsoft.com/office/drawing/2014/main" val="2553994940"/>
-                    </a:ext>
-                  </a:extLst>
-                </a:gridCol>
-              </a:tblGrid>
-              <a:tr h="534965">
-                <a:tc>
-                  <a:txBody>
-                    <a:bodyPr/>
-                    <a:lstStyle/>
-                    <a:p>
-                      <a:r>
-                        <a:rPr lang="en-US" sz="2400" dirty="0"/>
-                        <a:t>User Action</a:t>
-                      </a:r>
-                    </a:p>
-                  </a:txBody>
-                  <a:tcPr marL="121583" marR="121583" marT="60791" marB="60791"/>
-                </a:tc>
-                <a:tc>
-                  <a:txBody>
-                    <a:bodyPr/>
-                    <a:lstStyle/>
-                    <a:p>
-                      <a:r>
-                        <a:rPr lang="en-US" sz="2400" dirty="0"/>
-                        <a:t>System Response</a:t>
-                      </a:r>
-                    </a:p>
-                  </a:txBody>
-                  <a:tcPr marL="121583" marR="121583" marT="60791" marB="60791"/>
-                </a:tc>
-                <a:extLst>
-                  <a:ext uri="{0D108BD9-81ED-4DB2-BD59-A6C34878D82A}">
-                    <a16:rowId xmlns:a16="http://schemas.microsoft.com/office/drawing/2014/main" val="3952563860"/>
-                  </a:ext>
-                </a:extLst>
-              </a:tr>
-              <a:tr h="899713">
-                <a:tc>
-                  <a:txBody>
-                    <a:bodyPr/>
-                    <a:lstStyle/>
-                    <a:p>
-                      <a:r>
-                        <a:rPr lang="en-US" sz="2400" dirty="0"/>
-                        <a:t>User select </a:t>
-                      </a:r>
-                      <a:r>
-                        <a:rPr lang="en-US" sz="2400" dirty="0" err="1"/>
-                        <a:t>memberID</a:t>
-                      </a:r>
-                      <a:r>
-                        <a:rPr lang="en-US" sz="2400" dirty="0"/>
-                        <a:t> and ISBN in main view</a:t>
-                      </a:r>
-                    </a:p>
-                  </a:txBody>
-                  <a:tcPr marL="121583" marR="121583" marT="60791" marB="60791"/>
-                </a:tc>
-                <a:tc>
-                  <a:txBody>
-                    <a:bodyPr/>
-                    <a:lstStyle/>
-                    <a:p>
-                      <a:r>
-                        <a:rPr lang="en-US" sz="2400" dirty="0"/>
-                        <a:t>System respond with the list of </a:t>
-                      </a:r>
-                      <a:r>
-                        <a:rPr lang="en-US" sz="2400" dirty="0" err="1"/>
-                        <a:t>memberID</a:t>
-                      </a:r>
-                      <a:r>
-                        <a:rPr lang="en-US" sz="2400" dirty="0"/>
-                        <a:t> and ISBN in screen</a:t>
-                      </a:r>
-                    </a:p>
-                  </a:txBody>
-                  <a:tcPr marL="121583" marR="121583" marT="60791" marB="60791"/>
-                </a:tc>
-                <a:extLst>
-                  <a:ext uri="{0D108BD9-81ED-4DB2-BD59-A6C34878D82A}">
-                    <a16:rowId xmlns:a16="http://schemas.microsoft.com/office/drawing/2014/main" val="1121593986"/>
-                  </a:ext>
-                </a:extLst>
-              </a:tr>
-              <a:tr h="1629210">
-                <a:tc>
-                  <a:txBody>
-                    <a:bodyPr/>
-                    <a:lstStyle/>
-                    <a:p>
-                      <a:r>
-                        <a:rPr lang="en-US" sz="2400" dirty="0"/>
-                        <a:t>User click button “Checkout Book”</a:t>
-                      </a:r>
-                    </a:p>
-                  </a:txBody>
-                  <a:tcPr marL="121583" marR="121583" marT="60791" marB="60791"/>
-                </a:tc>
-                <a:tc>
-                  <a:txBody>
-                    <a:bodyPr/>
-                    <a:lstStyle/>
-                    <a:p>
-                      <a:r>
-                        <a:rPr lang="en-US" sz="2400" dirty="0"/>
-                        <a:t>System validate both member and book copy availability and record the book checkout record and respond with a success message.</a:t>
-                      </a:r>
-                    </a:p>
-                  </a:txBody>
-                  <a:tcPr marL="121583" marR="121583" marT="60791" marB="60791"/>
-                </a:tc>
-                <a:extLst>
-                  <a:ext uri="{0D108BD9-81ED-4DB2-BD59-A6C34878D82A}">
-                    <a16:rowId xmlns:a16="http://schemas.microsoft.com/office/drawing/2014/main" val="2507440164"/>
-                  </a:ext>
-                </a:extLst>
-              </a:tr>
-            </a:tbl>
-          </a:graphicData>
-        </a:graphic>
-      </p:graphicFrame>
-      <p:sp>
-        <p:nvSpPr>
-          <p:cNvPr id="5" name="Rectangle 4">
+        </p:nvPicPr>
+        <p:blipFill>
+          <a:blip r:embed="rId2">
             <a:extLst>
-              <a:ext uri="{FF2B5EF4-FFF2-40B4-BE49-F238E27FC236}">
-                <a16:creationId xmlns:a16="http://schemas.microsoft.com/office/drawing/2014/main" id="{4C462DB1-ADC3-7485-E4CE-022B25BCB229}"/>
+              <a:ext uri="{28A0092B-C50C-407E-A947-70E740481C1C}">
+                <a14:useLocalDpi xmlns:a14="http://schemas.microsoft.com/office/drawing/2010/main" val="0"/>
               </a:ext>
             </a:extLst>
-          </p:cNvPr>
-          <p:cNvSpPr/>
-          <p:nvPr/>
-        </p:nvSpPr>
+          </a:blip>
+          <a:stretch>
+            <a:fillRect/>
+          </a:stretch>
+        </p:blipFill>
         <p:spPr>
           <a:xfrm>
-            <a:off x="4194258" y="6217249"/>
-            <a:ext cx="4540475" cy="769441"/>
+            <a:off x="2887663" y="1901825"/>
+            <a:ext cx="6477000" cy="3911600"/>
           </a:xfrm>
-          <a:prstGeom prst="rect">
-            <a:avLst/>
-          </a:prstGeom>
-          <a:noFill/>
         </p:spPr>
-        <p:txBody>
-          <a:bodyPr wrap="none" lIns="91440" tIns="45720" rIns="91440" bIns="45720">
-            <a:spAutoFit/>
-          </a:bodyPr>
-          <a:lstStyle/>
-          <a:p>
-            <a:pPr algn="ctr"/>
-            <a:r>
-              <a:rPr lang="en-US" sz="4400" b="1" cap="none" spc="0" dirty="0">
-                <a:ln w="10160">
-                  <a:solidFill>
-                    <a:schemeClr val="accent5"/>
-                  </a:solidFill>
-                  <a:prstDash val="solid"/>
-                </a:ln>
-                <a:solidFill>
-                  <a:srgbClr val="FFFFFF"/>
-                </a:solidFill>
-                <a:effectLst>
-                  <a:outerShdw blurRad="38100" dist="22860" dir="5400000" algn="tl" rotWithShape="0">
-                    <a:srgbClr val="000000">
-                      <a:alpha val="30000"/>
-                    </a:srgbClr>
-                  </a:outerShdw>
-                </a:effectLst>
-              </a:rPr>
-              <a:t>Sequence Diagram</a:t>
-            </a:r>
-          </a:p>
-        </p:txBody>
-      </p:sp>
+      </p:pic>
     </p:spTree>
     <p:extLst>
       <p:ext uri="{BB962C8B-B14F-4D97-AF65-F5344CB8AC3E}">
-        <p14:creationId xmlns:p14="http://schemas.microsoft.com/office/powerpoint/2010/main" val="2241826948"/>
+        <p14:creationId xmlns:p14="http://schemas.microsoft.com/office/powerpoint/2010/main" val="3524684156"/>
       </p:ext>
     </p:extLst>
   </p:cSld>

</xml_diff>